<commit_message>
Jws revised tut (#1651; JW)
</commit_message>
<xml_diff>
--- a/tutorials/pipelines/tut_a_st_bud/vector files/fig03.pptx
+++ b/tutorials/pipelines/tut_a_st_bud/vector files/fig03.pptx
@@ -2,21 +2,18 @@
 <file path=ppt/presentation.xml><?xml version="1.0" encoding="utf-8"?>
 <p:presentation xmlns:a="http://schemas.openxmlformats.org/drawingml/2006/main" xmlns:r="http://schemas.openxmlformats.org/officeDocument/2006/relationships" xmlns:p="http://schemas.openxmlformats.org/presentationml/2006/main" saveSubsetFonts="1">
   <p:sldMasterIdLst>
-    <p:sldMasterId id="2147483864" r:id="rId1"/>
+    <p:sldMasterId id="2147483720" r:id="rId1"/>
   </p:sldMasterIdLst>
-  <p:notesMasterIdLst>
-    <p:notesMasterId r:id="rId3"/>
-  </p:notesMasterIdLst>
   <p:sldIdLst>
     <p:sldId id="256" r:id="rId2"/>
   </p:sldIdLst>
-  <p:sldSz cx="17279938" cy="7199313"/>
+  <p:sldSz cx="5400675" cy="10799763"/>
   <p:notesSz cx="6858000" cy="9144000"/>
   <p:defaultTextStyle>
     <a:defPPr>
       <a:defRPr lang="en-US"/>
     </a:defPPr>
-    <a:lvl1pPr marL="0" algn="l" defTabSz="457200" rtl="0" eaLnBrk="1" latinLnBrk="0" hangingPunct="1">
+    <a:lvl1pPr marL="0" algn="l" defTabSz="457177" rtl="0" eaLnBrk="1" latinLnBrk="0" hangingPunct="1">
       <a:defRPr sz="1800" kern="1200">
         <a:solidFill>
           <a:schemeClr val="tx1"/>
@@ -26,7 +23,7 @@
         <a:cs typeface="+mn-cs"/>
       </a:defRPr>
     </a:lvl1pPr>
-    <a:lvl2pPr marL="457200" algn="l" defTabSz="457200" rtl="0" eaLnBrk="1" latinLnBrk="0" hangingPunct="1">
+    <a:lvl2pPr marL="457177" algn="l" defTabSz="457177" rtl="0" eaLnBrk="1" latinLnBrk="0" hangingPunct="1">
       <a:defRPr sz="1800" kern="1200">
         <a:solidFill>
           <a:schemeClr val="tx1"/>
@@ -36,7 +33,7 @@
         <a:cs typeface="+mn-cs"/>
       </a:defRPr>
     </a:lvl2pPr>
-    <a:lvl3pPr marL="914400" algn="l" defTabSz="457200" rtl="0" eaLnBrk="1" latinLnBrk="0" hangingPunct="1">
+    <a:lvl3pPr marL="914354" algn="l" defTabSz="457177" rtl="0" eaLnBrk="1" latinLnBrk="0" hangingPunct="1">
       <a:defRPr sz="1800" kern="1200">
         <a:solidFill>
           <a:schemeClr val="tx1"/>
@@ -46,7 +43,7 @@
         <a:cs typeface="+mn-cs"/>
       </a:defRPr>
     </a:lvl3pPr>
-    <a:lvl4pPr marL="1371600" algn="l" defTabSz="457200" rtl="0" eaLnBrk="1" latinLnBrk="0" hangingPunct="1">
+    <a:lvl4pPr marL="1371533" algn="l" defTabSz="457177" rtl="0" eaLnBrk="1" latinLnBrk="0" hangingPunct="1">
       <a:defRPr sz="1800" kern="1200">
         <a:solidFill>
           <a:schemeClr val="tx1"/>
@@ -56,7 +53,7 @@
         <a:cs typeface="+mn-cs"/>
       </a:defRPr>
     </a:lvl4pPr>
-    <a:lvl5pPr marL="1828800" algn="l" defTabSz="457200" rtl="0" eaLnBrk="1" latinLnBrk="0" hangingPunct="1">
+    <a:lvl5pPr marL="1828710" algn="l" defTabSz="457177" rtl="0" eaLnBrk="1" latinLnBrk="0" hangingPunct="1">
       <a:defRPr sz="1800" kern="1200">
         <a:solidFill>
           <a:schemeClr val="tx1"/>
@@ -66,7 +63,7 @@
         <a:cs typeface="+mn-cs"/>
       </a:defRPr>
     </a:lvl5pPr>
-    <a:lvl6pPr marL="2286000" algn="l" defTabSz="457200" rtl="0" eaLnBrk="1" latinLnBrk="0" hangingPunct="1">
+    <a:lvl6pPr marL="2285887" algn="l" defTabSz="457177" rtl="0" eaLnBrk="1" latinLnBrk="0" hangingPunct="1">
       <a:defRPr sz="1800" kern="1200">
         <a:solidFill>
           <a:schemeClr val="tx1"/>
@@ -76,7 +73,7 @@
         <a:cs typeface="+mn-cs"/>
       </a:defRPr>
     </a:lvl6pPr>
-    <a:lvl7pPr marL="2743200" algn="l" defTabSz="457200" rtl="0" eaLnBrk="1" latinLnBrk="0" hangingPunct="1">
+    <a:lvl7pPr marL="2743064" algn="l" defTabSz="457177" rtl="0" eaLnBrk="1" latinLnBrk="0" hangingPunct="1">
       <a:defRPr sz="1800" kern="1200">
         <a:solidFill>
           <a:schemeClr val="tx1"/>
@@ -86,7 +83,7 @@
         <a:cs typeface="+mn-cs"/>
       </a:defRPr>
     </a:lvl7pPr>
-    <a:lvl8pPr marL="3200400" algn="l" defTabSz="457200" rtl="0" eaLnBrk="1" latinLnBrk="0" hangingPunct="1">
+    <a:lvl8pPr marL="3200241" algn="l" defTabSz="457177" rtl="0" eaLnBrk="1" latinLnBrk="0" hangingPunct="1">
       <a:defRPr sz="1800" kern="1200">
         <a:solidFill>
           <a:schemeClr val="tx1"/>
@@ -96,7 +93,7 @@
         <a:cs typeface="+mn-cs"/>
       </a:defRPr>
     </a:lvl8pPr>
-    <a:lvl9pPr marL="3657600" algn="l" defTabSz="457200" rtl="0" eaLnBrk="1" latinLnBrk="0" hangingPunct="1">
+    <a:lvl9pPr marL="3657419" algn="l" defTabSz="457177" rtl="0" eaLnBrk="1" latinLnBrk="0" hangingPunct="1">
       <a:defRPr sz="1800" kern="1200">
         <a:solidFill>
           <a:schemeClr val="tx1"/>
@@ -113,444 +110,6 @@
     </p:ext>
   </p:extLst>
 </p:presentation>
-</file>
-
-<file path=ppt/notesMasters/notesMaster1.xml><?xml version="1.0" encoding="utf-8"?>
-<p:notesMaster xmlns:a="http://schemas.openxmlformats.org/drawingml/2006/main" xmlns:r="http://schemas.openxmlformats.org/officeDocument/2006/relationships" xmlns:p="http://schemas.openxmlformats.org/presentationml/2006/main">
-  <p:cSld>
-    <p:bg>
-      <p:bgRef idx="1001">
-        <a:schemeClr val="bg1"/>
-      </p:bgRef>
-    </p:bg>
-    <p:spTree>
-      <p:nvGrpSpPr>
-        <p:cNvPr id="1" name=""/>
-        <p:cNvGrpSpPr/>
-        <p:nvPr/>
-      </p:nvGrpSpPr>
-      <p:grpSpPr>
-        <a:xfrm>
-          <a:off x="0" y="0"/>
-          <a:ext cx="0" cy="0"/>
-          <a:chOff x="0" y="0"/>
-          <a:chExt cx="0" cy="0"/>
-        </a:xfrm>
-      </p:grpSpPr>
-      <p:sp>
-        <p:nvSpPr>
-          <p:cNvPr id="2" name="页眉占位符 1"/>
-          <p:cNvSpPr>
-            <a:spLocks noGrp="1"/>
-          </p:cNvSpPr>
-          <p:nvPr>
-            <p:ph type="hdr" sz="quarter"/>
-          </p:nvPr>
-        </p:nvSpPr>
-        <p:spPr>
-          <a:xfrm>
-            <a:off x="0" y="0"/>
-            <a:ext cx="2971800" cy="458788"/>
-          </a:xfrm>
-          <a:prstGeom prst="rect">
-            <a:avLst/>
-          </a:prstGeom>
-        </p:spPr>
-        <p:txBody>
-          <a:bodyPr vert="horz" lIns="91440" tIns="45720" rIns="91440" bIns="45720" rtlCol="0"/>
-          <a:lstStyle>
-            <a:lvl1pPr algn="l">
-              <a:defRPr sz="1200"/>
-            </a:lvl1pPr>
-          </a:lstStyle>
-          <a:p>
-            <a:endParaRPr lang="zh-CN" altLang="en-US"/>
-          </a:p>
-        </p:txBody>
-      </p:sp>
-      <p:sp>
-        <p:nvSpPr>
-          <p:cNvPr id="3" name="日期占位符 2"/>
-          <p:cNvSpPr>
-            <a:spLocks noGrp="1"/>
-          </p:cNvSpPr>
-          <p:nvPr>
-            <p:ph type="dt" idx="1"/>
-          </p:nvPr>
-        </p:nvSpPr>
-        <p:spPr>
-          <a:xfrm>
-            <a:off x="3884613" y="0"/>
-            <a:ext cx="2971800" cy="458788"/>
-          </a:xfrm>
-          <a:prstGeom prst="rect">
-            <a:avLst/>
-          </a:prstGeom>
-        </p:spPr>
-        <p:txBody>
-          <a:bodyPr vert="horz" lIns="91440" tIns="45720" rIns="91440" bIns="45720" rtlCol="0"/>
-          <a:lstStyle>
-            <a:lvl1pPr algn="r">
-              <a:defRPr sz="1200"/>
-            </a:lvl1pPr>
-          </a:lstStyle>
-          <a:p>
-            <a:fld id="{00908931-0033-4484-A0E5-3BAAC1BCE9A0}" type="datetimeFigureOut">
-              <a:rPr lang="zh-CN" altLang="en-US" smtClean="0"/>
-              <a:t>2023/10/3</a:t>
-            </a:fld>
-            <a:endParaRPr lang="zh-CN" altLang="en-US"/>
-          </a:p>
-        </p:txBody>
-      </p:sp>
-      <p:sp>
-        <p:nvSpPr>
-          <p:cNvPr id="4" name="幻灯片图像占位符 3"/>
-          <p:cNvSpPr>
-            <a:spLocks noGrp="1" noRot="1" noChangeAspect="1"/>
-          </p:cNvSpPr>
-          <p:nvPr>
-            <p:ph type="sldImg" idx="2"/>
-          </p:nvPr>
-        </p:nvSpPr>
-        <p:spPr>
-          <a:xfrm>
-            <a:off x="-274638" y="1143000"/>
-            <a:ext cx="7407276" cy="3086100"/>
-          </a:xfrm>
-          <a:prstGeom prst="rect">
-            <a:avLst/>
-          </a:prstGeom>
-          <a:noFill/>
-          <a:ln w="12700">
-            <a:solidFill>
-              <a:prstClr val="black"/>
-            </a:solidFill>
-          </a:ln>
-        </p:spPr>
-        <p:txBody>
-          <a:bodyPr vert="horz" lIns="91440" tIns="45720" rIns="91440" bIns="45720" rtlCol="0" anchor="ctr"/>
-          <a:lstStyle/>
-          <a:p>
-            <a:endParaRPr lang="zh-CN" altLang="en-US"/>
-          </a:p>
-        </p:txBody>
-      </p:sp>
-      <p:sp>
-        <p:nvSpPr>
-          <p:cNvPr id="5" name="备注占位符 4"/>
-          <p:cNvSpPr>
-            <a:spLocks noGrp="1"/>
-          </p:cNvSpPr>
-          <p:nvPr>
-            <p:ph type="body" sz="quarter" idx="3"/>
-          </p:nvPr>
-        </p:nvSpPr>
-        <p:spPr>
-          <a:xfrm>
-            <a:off x="685800" y="4400550"/>
-            <a:ext cx="5486400" cy="3600450"/>
-          </a:xfrm>
-          <a:prstGeom prst="rect">
-            <a:avLst/>
-          </a:prstGeom>
-        </p:spPr>
-        <p:txBody>
-          <a:bodyPr vert="horz" lIns="91440" tIns="45720" rIns="91440" bIns="45720" rtlCol="0"/>
-          <a:lstStyle/>
-          <a:p>
-            <a:pPr lvl="0"/>
-            <a:r>
-              <a:rPr lang="zh-CN" altLang="en-US"/>
-              <a:t>单击此处编辑母版文本样式</a:t>
-            </a:r>
-          </a:p>
-          <a:p>
-            <a:pPr lvl="1"/>
-            <a:r>
-              <a:rPr lang="zh-CN" altLang="en-US"/>
-              <a:t>二级</a:t>
-            </a:r>
-          </a:p>
-          <a:p>
-            <a:pPr lvl="2"/>
-            <a:r>
-              <a:rPr lang="zh-CN" altLang="en-US"/>
-              <a:t>三级</a:t>
-            </a:r>
-          </a:p>
-          <a:p>
-            <a:pPr lvl="3"/>
-            <a:r>
-              <a:rPr lang="zh-CN" altLang="en-US"/>
-              <a:t>四级</a:t>
-            </a:r>
-          </a:p>
-          <a:p>
-            <a:pPr lvl="4"/>
-            <a:r>
-              <a:rPr lang="zh-CN" altLang="en-US"/>
-              <a:t>五级</a:t>
-            </a:r>
-          </a:p>
-        </p:txBody>
-      </p:sp>
-      <p:sp>
-        <p:nvSpPr>
-          <p:cNvPr id="6" name="页脚占位符 5"/>
-          <p:cNvSpPr>
-            <a:spLocks noGrp="1"/>
-          </p:cNvSpPr>
-          <p:nvPr>
-            <p:ph type="ftr" sz="quarter" idx="4"/>
-          </p:nvPr>
-        </p:nvSpPr>
-        <p:spPr>
-          <a:xfrm>
-            <a:off x="0" y="8685213"/>
-            <a:ext cx="2971800" cy="458787"/>
-          </a:xfrm>
-          <a:prstGeom prst="rect">
-            <a:avLst/>
-          </a:prstGeom>
-        </p:spPr>
-        <p:txBody>
-          <a:bodyPr vert="horz" lIns="91440" tIns="45720" rIns="91440" bIns="45720" rtlCol="0" anchor="b"/>
-          <a:lstStyle>
-            <a:lvl1pPr algn="l">
-              <a:defRPr sz="1200"/>
-            </a:lvl1pPr>
-          </a:lstStyle>
-          <a:p>
-            <a:endParaRPr lang="zh-CN" altLang="en-US"/>
-          </a:p>
-        </p:txBody>
-      </p:sp>
-      <p:sp>
-        <p:nvSpPr>
-          <p:cNvPr id="7" name="灯片编号占位符 6"/>
-          <p:cNvSpPr>
-            <a:spLocks noGrp="1"/>
-          </p:cNvSpPr>
-          <p:nvPr>
-            <p:ph type="sldNum" sz="quarter" idx="5"/>
-          </p:nvPr>
-        </p:nvSpPr>
-        <p:spPr>
-          <a:xfrm>
-            <a:off x="3884613" y="8685213"/>
-            <a:ext cx="2971800" cy="458787"/>
-          </a:xfrm>
-          <a:prstGeom prst="rect">
-            <a:avLst/>
-          </a:prstGeom>
-        </p:spPr>
-        <p:txBody>
-          <a:bodyPr vert="horz" lIns="91440" tIns="45720" rIns="91440" bIns="45720" rtlCol="0" anchor="b"/>
-          <a:lstStyle>
-            <a:lvl1pPr algn="r">
-              <a:defRPr sz="1200"/>
-            </a:lvl1pPr>
-          </a:lstStyle>
-          <a:p>
-            <a:fld id="{3A2B37E6-ED18-4D02-8887-EF535A95937D}" type="slidenum">
-              <a:rPr lang="zh-CN" altLang="en-US" smtClean="0"/>
-              <a:t>‹#›</a:t>
-            </a:fld>
-            <a:endParaRPr lang="zh-CN" altLang="en-US"/>
-          </a:p>
-        </p:txBody>
-      </p:sp>
-    </p:spTree>
-    <p:extLst>
-      <p:ext uri="{BB962C8B-B14F-4D97-AF65-F5344CB8AC3E}">
-        <p14:creationId xmlns:p14="http://schemas.microsoft.com/office/powerpoint/2010/main" val="1928097840"/>
-      </p:ext>
-    </p:extLst>
-  </p:cSld>
-  <p:clrMap bg1="lt1" tx1="dk1" bg2="lt2" tx2="dk2" accent1="accent1" accent2="accent2" accent3="accent3" accent4="accent4" accent5="accent5" accent6="accent6" hlink="hlink" folHlink="folHlink"/>
-  <p:notesStyle>
-    <a:lvl1pPr marL="0" algn="l" defTabSz="1846082" rtl="0" eaLnBrk="1" latinLnBrk="0" hangingPunct="1">
-      <a:defRPr sz="2423" kern="1200">
-        <a:solidFill>
-          <a:schemeClr val="tx1"/>
-        </a:solidFill>
-        <a:latin typeface="+mn-lt"/>
-        <a:ea typeface="+mn-ea"/>
-        <a:cs typeface="+mn-cs"/>
-      </a:defRPr>
-    </a:lvl1pPr>
-    <a:lvl2pPr marL="923041" algn="l" defTabSz="1846082" rtl="0" eaLnBrk="1" latinLnBrk="0" hangingPunct="1">
-      <a:defRPr sz="2423" kern="1200">
-        <a:solidFill>
-          <a:schemeClr val="tx1"/>
-        </a:solidFill>
-        <a:latin typeface="+mn-lt"/>
-        <a:ea typeface="+mn-ea"/>
-        <a:cs typeface="+mn-cs"/>
-      </a:defRPr>
-    </a:lvl2pPr>
-    <a:lvl3pPr marL="1846082" algn="l" defTabSz="1846082" rtl="0" eaLnBrk="1" latinLnBrk="0" hangingPunct="1">
-      <a:defRPr sz="2423" kern="1200">
-        <a:solidFill>
-          <a:schemeClr val="tx1"/>
-        </a:solidFill>
-        <a:latin typeface="+mn-lt"/>
-        <a:ea typeface="+mn-ea"/>
-        <a:cs typeface="+mn-cs"/>
-      </a:defRPr>
-    </a:lvl3pPr>
-    <a:lvl4pPr marL="2769123" algn="l" defTabSz="1846082" rtl="0" eaLnBrk="1" latinLnBrk="0" hangingPunct="1">
-      <a:defRPr sz="2423" kern="1200">
-        <a:solidFill>
-          <a:schemeClr val="tx1"/>
-        </a:solidFill>
-        <a:latin typeface="+mn-lt"/>
-        <a:ea typeface="+mn-ea"/>
-        <a:cs typeface="+mn-cs"/>
-      </a:defRPr>
-    </a:lvl4pPr>
-    <a:lvl5pPr marL="3692164" algn="l" defTabSz="1846082" rtl="0" eaLnBrk="1" latinLnBrk="0" hangingPunct="1">
-      <a:defRPr sz="2423" kern="1200">
-        <a:solidFill>
-          <a:schemeClr val="tx1"/>
-        </a:solidFill>
-        <a:latin typeface="+mn-lt"/>
-        <a:ea typeface="+mn-ea"/>
-        <a:cs typeface="+mn-cs"/>
-      </a:defRPr>
-    </a:lvl5pPr>
-    <a:lvl6pPr marL="4615205" algn="l" defTabSz="1846082" rtl="0" eaLnBrk="1" latinLnBrk="0" hangingPunct="1">
-      <a:defRPr sz="2423" kern="1200">
-        <a:solidFill>
-          <a:schemeClr val="tx1"/>
-        </a:solidFill>
-        <a:latin typeface="+mn-lt"/>
-        <a:ea typeface="+mn-ea"/>
-        <a:cs typeface="+mn-cs"/>
-      </a:defRPr>
-    </a:lvl6pPr>
-    <a:lvl7pPr marL="5538246" algn="l" defTabSz="1846082" rtl="0" eaLnBrk="1" latinLnBrk="0" hangingPunct="1">
-      <a:defRPr sz="2423" kern="1200">
-        <a:solidFill>
-          <a:schemeClr val="tx1"/>
-        </a:solidFill>
-        <a:latin typeface="+mn-lt"/>
-        <a:ea typeface="+mn-ea"/>
-        <a:cs typeface="+mn-cs"/>
-      </a:defRPr>
-    </a:lvl7pPr>
-    <a:lvl8pPr marL="6461288" algn="l" defTabSz="1846082" rtl="0" eaLnBrk="1" latinLnBrk="0" hangingPunct="1">
-      <a:defRPr sz="2423" kern="1200">
-        <a:solidFill>
-          <a:schemeClr val="tx1"/>
-        </a:solidFill>
-        <a:latin typeface="+mn-lt"/>
-        <a:ea typeface="+mn-ea"/>
-        <a:cs typeface="+mn-cs"/>
-      </a:defRPr>
-    </a:lvl8pPr>
-    <a:lvl9pPr marL="7384329" algn="l" defTabSz="1846082" rtl="0" eaLnBrk="1" latinLnBrk="0" hangingPunct="1">
-      <a:defRPr sz="2423" kern="1200">
-        <a:solidFill>
-          <a:schemeClr val="tx1"/>
-        </a:solidFill>
-        <a:latin typeface="+mn-lt"/>
-        <a:ea typeface="+mn-ea"/>
-        <a:cs typeface="+mn-cs"/>
-      </a:defRPr>
-    </a:lvl9pPr>
-  </p:notesStyle>
-</p:notesMaster>
-</file>
-
-<file path=ppt/notesSlides/notesSlide1.xml><?xml version="1.0" encoding="utf-8"?>
-<p:notes xmlns:a="http://schemas.openxmlformats.org/drawingml/2006/main" xmlns:r="http://schemas.openxmlformats.org/officeDocument/2006/relationships" xmlns:p="http://schemas.openxmlformats.org/presentationml/2006/main">
-  <p:cSld>
-    <p:spTree>
-      <p:nvGrpSpPr>
-        <p:cNvPr id="1" name=""/>
-        <p:cNvGrpSpPr/>
-        <p:nvPr/>
-      </p:nvGrpSpPr>
-      <p:grpSpPr>
-        <a:xfrm>
-          <a:off x="0" y="0"/>
-          <a:ext cx="0" cy="0"/>
-          <a:chOff x="0" y="0"/>
-          <a:chExt cx="0" cy="0"/>
-        </a:xfrm>
-      </p:grpSpPr>
-      <p:sp>
-        <p:nvSpPr>
-          <p:cNvPr id="2" name="幻灯片图像占位符 1"/>
-          <p:cNvSpPr>
-            <a:spLocks noGrp="1" noRot="1" noChangeAspect="1"/>
-          </p:cNvSpPr>
-          <p:nvPr>
-            <p:ph type="sldImg"/>
-          </p:nvPr>
-        </p:nvSpPr>
-        <p:spPr>
-          <a:xfrm>
-            <a:off x="-274638" y="1143000"/>
-            <a:ext cx="7407276" cy="3086100"/>
-          </a:xfrm>
-        </p:spPr>
-      </p:sp>
-      <p:sp>
-        <p:nvSpPr>
-          <p:cNvPr id="3" name="备注占位符 2"/>
-          <p:cNvSpPr>
-            <a:spLocks noGrp="1"/>
-          </p:cNvSpPr>
-          <p:nvPr>
-            <p:ph type="body" idx="1"/>
-          </p:nvPr>
-        </p:nvSpPr>
-        <p:spPr/>
-        <p:txBody>
-          <a:bodyPr/>
-          <a:lstStyle/>
-          <a:p>
-            <a:endParaRPr lang="zh-CN" altLang="en-US" dirty="0"/>
-          </a:p>
-        </p:txBody>
-      </p:sp>
-      <p:sp>
-        <p:nvSpPr>
-          <p:cNvPr id="4" name="灯片编号占位符 3"/>
-          <p:cNvSpPr>
-            <a:spLocks noGrp="1"/>
-          </p:cNvSpPr>
-          <p:nvPr>
-            <p:ph type="sldNum" sz="quarter" idx="5"/>
-          </p:nvPr>
-        </p:nvSpPr>
-        <p:spPr/>
-        <p:txBody>
-          <a:bodyPr/>
-          <a:lstStyle/>
-          <a:p>
-            <a:fld id="{3A2B37E6-ED18-4D02-8887-EF535A95937D}" type="slidenum">
-              <a:rPr lang="zh-CN" altLang="en-US" smtClean="0"/>
-              <a:t>1</a:t>
-            </a:fld>
-            <a:endParaRPr lang="zh-CN" altLang="en-US"/>
-          </a:p>
-        </p:txBody>
-      </p:sp>
-    </p:spTree>
-    <p:extLst>
-      <p:ext uri="{BB962C8B-B14F-4D97-AF65-F5344CB8AC3E}">
-        <p14:creationId xmlns:p14="http://schemas.microsoft.com/office/powerpoint/2010/main" val="2375913529"/>
-      </p:ext>
-    </p:extLst>
-  </p:cSld>
-  <p:clrMapOvr>
-    <a:masterClrMapping/>
-  </p:clrMapOvr>
-</p:notes>
 </file>
 
 <file path=ppt/slideLayouts/slideLayout1.xml><?xml version="1.0" encoding="utf-8"?>
@@ -582,15 +141,15 @@
         </p:nvSpPr>
         <p:spPr>
           <a:xfrm>
-            <a:off x="2159992" y="1178222"/>
-            <a:ext cx="12959954" cy="2506427"/>
+            <a:off x="405051" y="1767463"/>
+            <a:ext cx="4590574" cy="3759917"/>
           </a:xfrm>
         </p:spPr>
         <p:txBody>
           <a:bodyPr anchor="b"/>
           <a:lstStyle>
             <a:lvl1pPr algn="ctr">
-              <a:defRPr sz="6299"/>
+              <a:defRPr sz="3544"/>
             </a:lvl1pPr>
           </a:lstStyle>
           <a:p>
@@ -614,8 +173,8 @@
         </p:nvSpPr>
         <p:spPr>
           <a:xfrm>
-            <a:off x="2159992" y="3781306"/>
-            <a:ext cx="12959954" cy="1738167"/>
+            <a:off x="675086" y="5672377"/>
+            <a:ext cx="4050506" cy="2607442"/>
           </a:xfrm>
         </p:spPr>
         <p:txBody>
@@ -623,39 +182,39 @@
           <a:lstStyle>
             <a:lvl1pPr marL="0" indent="0" algn="ctr">
               <a:buNone/>
-              <a:defRPr sz="2520"/>
+              <a:defRPr sz="1417"/>
             </a:lvl1pPr>
-            <a:lvl2pPr marL="479969" indent="0" algn="ctr">
-              <a:buNone/>
-              <a:defRPr sz="2100"/>
+            <a:lvl2pPr marL="270022" indent="0" algn="ctr">
+              <a:buNone/>
+              <a:defRPr sz="1181"/>
             </a:lvl2pPr>
-            <a:lvl3pPr marL="959937" indent="0" algn="ctr">
-              <a:buNone/>
-              <a:defRPr sz="1890"/>
+            <a:lvl3pPr marL="540045" indent="0" algn="ctr">
+              <a:buNone/>
+              <a:defRPr sz="1063"/>
             </a:lvl3pPr>
-            <a:lvl4pPr marL="1439906" indent="0" algn="ctr">
-              <a:buNone/>
-              <a:defRPr sz="1680"/>
+            <a:lvl4pPr marL="810067" indent="0" algn="ctr">
+              <a:buNone/>
+              <a:defRPr sz="945"/>
             </a:lvl4pPr>
-            <a:lvl5pPr marL="1919874" indent="0" algn="ctr">
-              <a:buNone/>
-              <a:defRPr sz="1680"/>
+            <a:lvl5pPr marL="1080089" indent="0" algn="ctr">
+              <a:buNone/>
+              <a:defRPr sz="945"/>
             </a:lvl5pPr>
-            <a:lvl6pPr marL="2399843" indent="0" algn="ctr">
-              <a:buNone/>
-              <a:defRPr sz="1680"/>
+            <a:lvl6pPr marL="1350112" indent="0" algn="ctr">
+              <a:buNone/>
+              <a:defRPr sz="945"/>
             </a:lvl6pPr>
-            <a:lvl7pPr marL="2879811" indent="0" algn="ctr">
-              <a:buNone/>
-              <a:defRPr sz="1680"/>
+            <a:lvl7pPr marL="1620134" indent="0" algn="ctr">
+              <a:buNone/>
+              <a:defRPr sz="945"/>
             </a:lvl7pPr>
-            <a:lvl8pPr marL="3359780" indent="0" algn="ctr">
-              <a:buNone/>
-              <a:defRPr sz="1680"/>
+            <a:lvl8pPr marL="1890156" indent="0" algn="ctr">
+              <a:buNone/>
+              <a:defRPr sz="945"/>
             </a:lvl8pPr>
-            <a:lvl9pPr marL="3839748" indent="0" algn="ctr">
-              <a:buNone/>
-              <a:defRPr sz="1680"/>
+            <a:lvl9pPr marL="2160179" indent="0" algn="ctr">
+              <a:buNone/>
+              <a:defRPr sz="945"/>
             </a:lvl9pPr>
           </a:lstStyle>
           <a:p>
@@ -684,7 +243,7 @@
           <a:p>
             <a:fld id="{CA1BB51F-BFC6-4DD3-8C2A-5B21FD6F69C3}" type="datetimeFigureOut">
               <a:rPr lang="en-SE" smtClean="0"/>
-              <a:t>10/03/2023</a:t>
+              <a:t>10/17/2023</a:t>
             </a:fld>
             <a:endParaRPr lang="en-SE"/>
           </a:p>
@@ -735,7 +294,7 @@
     </p:spTree>
     <p:extLst>
       <p:ext uri="{BB962C8B-B14F-4D97-AF65-F5344CB8AC3E}">
-        <p14:creationId xmlns:p14="http://schemas.microsoft.com/office/powerpoint/2010/main" val="1504405886"/>
+        <p14:creationId xmlns:p14="http://schemas.microsoft.com/office/powerpoint/2010/main" val="380860913"/>
       </p:ext>
     </p:extLst>
   </p:cSld>
@@ -854,7 +413,7 @@
           <a:p>
             <a:fld id="{CA1BB51F-BFC6-4DD3-8C2A-5B21FD6F69C3}" type="datetimeFigureOut">
               <a:rPr lang="en-SE" smtClean="0"/>
-              <a:t>10/03/2023</a:t>
+              <a:t>10/17/2023</a:t>
             </a:fld>
             <a:endParaRPr lang="en-SE"/>
           </a:p>
@@ -905,7 +464,7 @@
     </p:spTree>
     <p:extLst>
       <p:ext uri="{BB962C8B-B14F-4D97-AF65-F5344CB8AC3E}">
-        <p14:creationId xmlns:p14="http://schemas.microsoft.com/office/powerpoint/2010/main" val="2888207133"/>
+        <p14:creationId xmlns:p14="http://schemas.microsoft.com/office/powerpoint/2010/main" val="1944226404"/>
       </p:ext>
     </p:extLst>
   </p:cSld>
@@ -944,8 +503,8 @@
         </p:nvSpPr>
         <p:spPr>
           <a:xfrm>
-            <a:off x="12365955" y="383297"/>
-            <a:ext cx="3725987" cy="6101085"/>
+            <a:off x="3864858" y="574988"/>
+            <a:ext cx="1164522" cy="9152300"/>
           </a:xfrm>
         </p:spPr>
         <p:txBody>
@@ -972,8 +531,8 @@
         </p:nvSpPr>
         <p:spPr>
           <a:xfrm>
-            <a:off x="1187996" y="383297"/>
-            <a:ext cx="10961961" cy="6101085"/>
+            <a:off x="371298" y="574988"/>
+            <a:ext cx="3426052" cy="9152300"/>
           </a:xfrm>
         </p:spPr>
         <p:txBody>
@@ -1034,7 +593,7 @@
           <a:p>
             <a:fld id="{CA1BB51F-BFC6-4DD3-8C2A-5B21FD6F69C3}" type="datetimeFigureOut">
               <a:rPr lang="en-SE" smtClean="0"/>
-              <a:t>10/03/2023</a:t>
+              <a:t>10/17/2023</a:t>
             </a:fld>
             <a:endParaRPr lang="en-SE"/>
           </a:p>
@@ -1085,7 +644,7 @@
     </p:spTree>
     <p:extLst>
       <p:ext uri="{BB962C8B-B14F-4D97-AF65-F5344CB8AC3E}">
-        <p14:creationId xmlns:p14="http://schemas.microsoft.com/office/powerpoint/2010/main" val="554663425"/>
+        <p14:creationId xmlns:p14="http://schemas.microsoft.com/office/powerpoint/2010/main" val="2716199694"/>
       </p:ext>
     </p:extLst>
   </p:cSld>
@@ -1204,7 +763,7 @@
           <a:p>
             <a:fld id="{CA1BB51F-BFC6-4DD3-8C2A-5B21FD6F69C3}" type="datetimeFigureOut">
               <a:rPr lang="en-SE" smtClean="0"/>
-              <a:t>10/03/2023</a:t>
+              <a:t>10/17/2023</a:t>
             </a:fld>
             <a:endParaRPr lang="en-SE"/>
           </a:p>
@@ -1255,7 +814,7 @@
     </p:spTree>
     <p:extLst>
       <p:ext uri="{BB962C8B-B14F-4D97-AF65-F5344CB8AC3E}">
-        <p14:creationId xmlns:p14="http://schemas.microsoft.com/office/powerpoint/2010/main" val="3026262820"/>
+        <p14:creationId xmlns:p14="http://schemas.microsoft.com/office/powerpoint/2010/main" val="4252657588"/>
       </p:ext>
     </p:extLst>
   </p:cSld>
@@ -1294,15 +853,15 @@
         </p:nvSpPr>
         <p:spPr>
           <a:xfrm>
-            <a:off x="1178996" y="1794830"/>
-            <a:ext cx="14903947" cy="2994714"/>
+            <a:off x="368484" y="2692444"/>
+            <a:ext cx="4658083" cy="4492401"/>
           </a:xfrm>
         </p:spPr>
         <p:txBody>
           <a:bodyPr anchor="b"/>
           <a:lstStyle>
             <a:lvl1pPr>
-              <a:defRPr sz="6299"/>
+              <a:defRPr sz="3544"/>
             </a:lvl1pPr>
           </a:lstStyle>
           <a:p>
@@ -1326,8 +885,8 @@
         </p:nvSpPr>
         <p:spPr>
           <a:xfrm>
-            <a:off x="1178996" y="4817875"/>
-            <a:ext cx="14903947" cy="1574849"/>
+            <a:off x="368484" y="7227346"/>
+            <a:ext cx="4658083" cy="2362447"/>
           </a:xfrm>
         </p:spPr>
         <p:txBody>
@@ -1335,17 +894,15 @@
           <a:lstStyle>
             <a:lvl1pPr marL="0" indent="0">
               <a:buNone/>
-              <a:defRPr sz="2520">
+              <a:defRPr sz="1417">
                 <a:solidFill>
-                  <a:schemeClr val="tx1">
-                    <a:tint val="75000"/>
-                  </a:schemeClr>
+                  <a:schemeClr val="tx1"/>
                 </a:solidFill>
               </a:defRPr>
             </a:lvl1pPr>
-            <a:lvl2pPr marL="479969" indent="0">
-              <a:buNone/>
-              <a:defRPr sz="2100">
+            <a:lvl2pPr marL="270022" indent="0">
+              <a:buNone/>
+              <a:defRPr sz="1181">
                 <a:solidFill>
                   <a:schemeClr val="tx1">
                     <a:tint val="75000"/>
@@ -1353,9 +910,9 @@
                 </a:solidFill>
               </a:defRPr>
             </a:lvl2pPr>
-            <a:lvl3pPr marL="959937" indent="0">
-              <a:buNone/>
-              <a:defRPr sz="1890">
+            <a:lvl3pPr marL="540045" indent="0">
+              <a:buNone/>
+              <a:defRPr sz="1063">
                 <a:solidFill>
                   <a:schemeClr val="tx1">
                     <a:tint val="75000"/>
@@ -1363,9 +920,9 @@
                 </a:solidFill>
               </a:defRPr>
             </a:lvl3pPr>
-            <a:lvl4pPr marL="1439906" indent="0">
-              <a:buNone/>
-              <a:defRPr sz="1680">
+            <a:lvl4pPr marL="810067" indent="0">
+              <a:buNone/>
+              <a:defRPr sz="945">
                 <a:solidFill>
                   <a:schemeClr val="tx1">
                     <a:tint val="75000"/>
@@ -1373,9 +930,9 @@
                 </a:solidFill>
               </a:defRPr>
             </a:lvl4pPr>
-            <a:lvl5pPr marL="1919874" indent="0">
-              <a:buNone/>
-              <a:defRPr sz="1680">
+            <a:lvl5pPr marL="1080089" indent="0">
+              <a:buNone/>
+              <a:defRPr sz="945">
                 <a:solidFill>
                   <a:schemeClr val="tx1">
                     <a:tint val="75000"/>
@@ -1383,9 +940,9 @@
                 </a:solidFill>
               </a:defRPr>
             </a:lvl5pPr>
-            <a:lvl6pPr marL="2399843" indent="0">
-              <a:buNone/>
-              <a:defRPr sz="1680">
+            <a:lvl6pPr marL="1350112" indent="0">
+              <a:buNone/>
+              <a:defRPr sz="945">
                 <a:solidFill>
                   <a:schemeClr val="tx1">
                     <a:tint val="75000"/>
@@ -1393,9 +950,9 @@
                 </a:solidFill>
               </a:defRPr>
             </a:lvl6pPr>
-            <a:lvl7pPr marL="2879811" indent="0">
-              <a:buNone/>
-              <a:defRPr sz="1680">
+            <a:lvl7pPr marL="1620134" indent="0">
+              <a:buNone/>
+              <a:defRPr sz="945">
                 <a:solidFill>
                   <a:schemeClr val="tx1">
                     <a:tint val="75000"/>
@@ -1403,9 +960,9 @@
                 </a:solidFill>
               </a:defRPr>
             </a:lvl7pPr>
-            <a:lvl8pPr marL="3359780" indent="0">
-              <a:buNone/>
-              <a:defRPr sz="1680">
+            <a:lvl8pPr marL="1890156" indent="0">
+              <a:buNone/>
+              <a:defRPr sz="945">
                 <a:solidFill>
                   <a:schemeClr val="tx1">
                     <a:tint val="75000"/>
@@ -1413,9 +970,9 @@
                 </a:solidFill>
               </a:defRPr>
             </a:lvl8pPr>
-            <a:lvl9pPr marL="3839748" indent="0">
-              <a:buNone/>
-              <a:defRPr sz="1680">
+            <a:lvl9pPr marL="2160179" indent="0">
+              <a:buNone/>
+              <a:defRPr sz="945">
                 <a:solidFill>
                   <a:schemeClr val="tx1">
                     <a:tint val="75000"/>
@@ -1450,7 +1007,7 @@
           <a:p>
             <a:fld id="{CA1BB51F-BFC6-4DD3-8C2A-5B21FD6F69C3}" type="datetimeFigureOut">
               <a:rPr lang="en-SE" smtClean="0"/>
-              <a:t>10/03/2023</a:t>
+              <a:t>10/17/2023</a:t>
             </a:fld>
             <a:endParaRPr lang="en-SE"/>
           </a:p>
@@ -1501,7 +1058,7 @@
     </p:spTree>
     <p:extLst>
       <p:ext uri="{BB962C8B-B14F-4D97-AF65-F5344CB8AC3E}">
-        <p14:creationId xmlns:p14="http://schemas.microsoft.com/office/powerpoint/2010/main" val="324234121"/>
+        <p14:creationId xmlns:p14="http://schemas.microsoft.com/office/powerpoint/2010/main" val="4180779924"/>
       </p:ext>
     </p:extLst>
   </p:cSld>
@@ -1563,8 +1120,8 @@
         </p:nvSpPr>
         <p:spPr>
           <a:xfrm>
-            <a:off x="1187996" y="1916484"/>
-            <a:ext cx="7343974" cy="4567898"/>
+            <a:off x="371297" y="2874937"/>
+            <a:ext cx="2295287" cy="6852350"/>
           </a:xfrm>
         </p:spPr>
         <p:txBody>
@@ -1620,8 +1177,8 @@
         </p:nvSpPr>
         <p:spPr>
           <a:xfrm>
-            <a:off x="8747968" y="1916484"/>
-            <a:ext cx="7343974" cy="4567898"/>
+            <a:off x="2734093" y="2874937"/>
+            <a:ext cx="2295287" cy="6852350"/>
           </a:xfrm>
         </p:spPr>
         <p:txBody>
@@ -1682,7 +1239,7 @@
           <a:p>
             <a:fld id="{CA1BB51F-BFC6-4DD3-8C2A-5B21FD6F69C3}" type="datetimeFigureOut">
               <a:rPr lang="en-SE" smtClean="0"/>
-              <a:t>10/03/2023</a:t>
+              <a:t>10/17/2023</a:t>
             </a:fld>
             <a:endParaRPr lang="en-SE"/>
           </a:p>
@@ -1733,7 +1290,7 @@
     </p:spTree>
     <p:extLst>
       <p:ext uri="{BB962C8B-B14F-4D97-AF65-F5344CB8AC3E}">
-        <p14:creationId xmlns:p14="http://schemas.microsoft.com/office/powerpoint/2010/main" val="2271722460"/>
+        <p14:creationId xmlns:p14="http://schemas.microsoft.com/office/powerpoint/2010/main" val="2998009105"/>
       </p:ext>
     </p:extLst>
   </p:cSld>
@@ -1772,8 +1329,8 @@
         </p:nvSpPr>
         <p:spPr>
           <a:xfrm>
-            <a:off x="1190246" y="383297"/>
-            <a:ext cx="14903947" cy="1391534"/>
+            <a:off x="372000" y="574991"/>
+            <a:ext cx="4658083" cy="2087454"/>
           </a:xfrm>
         </p:spPr>
         <p:txBody>
@@ -1800,8 +1357,8 @@
         </p:nvSpPr>
         <p:spPr>
           <a:xfrm>
-            <a:off x="1190247" y="1764832"/>
-            <a:ext cx="7310223" cy="864917"/>
+            <a:off x="372001" y="2647445"/>
+            <a:ext cx="2284738" cy="1297471"/>
           </a:xfrm>
         </p:spPr>
         <p:txBody>
@@ -1809,39 +1366,39 @@
           <a:lstStyle>
             <a:lvl1pPr marL="0" indent="0">
               <a:buNone/>
-              <a:defRPr sz="2520" b="1"/>
+              <a:defRPr sz="1417" b="1"/>
             </a:lvl1pPr>
-            <a:lvl2pPr marL="479969" indent="0">
-              <a:buNone/>
-              <a:defRPr sz="2100" b="1"/>
+            <a:lvl2pPr marL="270022" indent="0">
+              <a:buNone/>
+              <a:defRPr sz="1181" b="1"/>
             </a:lvl2pPr>
-            <a:lvl3pPr marL="959937" indent="0">
-              <a:buNone/>
-              <a:defRPr sz="1890" b="1"/>
+            <a:lvl3pPr marL="540045" indent="0">
+              <a:buNone/>
+              <a:defRPr sz="1063" b="1"/>
             </a:lvl3pPr>
-            <a:lvl4pPr marL="1439906" indent="0">
-              <a:buNone/>
-              <a:defRPr sz="1680" b="1"/>
+            <a:lvl4pPr marL="810067" indent="0">
+              <a:buNone/>
+              <a:defRPr sz="945" b="1"/>
             </a:lvl4pPr>
-            <a:lvl5pPr marL="1919874" indent="0">
-              <a:buNone/>
-              <a:defRPr sz="1680" b="1"/>
+            <a:lvl5pPr marL="1080089" indent="0">
+              <a:buNone/>
+              <a:defRPr sz="945" b="1"/>
             </a:lvl5pPr>
-            <a:lvl6pPr marL="2399843" indent="0">
-              <a:buNone/>
-              <a:defRPr sz="1680" b="1"/>
+            <a:lvl6pPr marL="1350112" indent="0">
+              <a:buNone/>
+              <a:defRPr sz="945" b="1"/>
             </a:lvl6pPr>
-            <a:lvl7pPr marL="2879811" indent="0">
-              <a:buNone/>
-              <a:defRPr sz="1680" b="1"/>
+            <a:lvl7pPr marL="1620134" indent="0">
+              <a:buNone/>
+              <a:defRPr sz="945" b="1"/>
             </a:lvl7pPr>
-            <a:lvl8pPr marL="3359780" indent="0">
-              <a:buNone/>
-              <a:defRPr sz="1680" b="1"/>
+            <a:lvl8pPr marL="1890156" indent="0">
+              <a:buNone/>
+              <a:defRPr sz="945" b="1"/>
             </a:lvl8pPr>
-            <a:lvl9pPr marL="3839748" indent="0">
-              <a:buNone/>
-              <a:defRPr sz="1680" b="1"/>
+            <a:lvl9pPr marL="2160179" indent="0">
+              <a:buNone/>
+              <a:defRPr sz="945" b="1"/>
             </a:lvl9pPr>
           </a:lstStyle>
           <a:p>
@@ -1865,8 +1422,8 @@
         </p:nvSpPr>
         <p:spPr>
           <a:xfrm>
-            <a:off x="1190247" y="2629749"/>
-            <a:ext cx="7310223" cy="3867965"/>
+            <a:off x="372001" y="3944915"/>
+            <a:ext cx="2284738" cy="5802372"/>
           </a:xfrm>
         </p:spPr>
         <p:txBody>
@@ -1922,8 +1479,8 @@
         </p:nvSpPr>
         <p:spPr>
           <a:xfrm>
-            <a:off x="8747969" y="1764832"/>
-            <a:ext cx="7346224" cy="864917"/>
+            <a:off x="2734093" y="2647445"/>
+            <a:ext cx="2295990" cy="1297471"/>
           </a:xfrm>
         </p:spPr>
         <p:txBody>
@@ -1931,39 +1488,39 @@
           <a:lstStyle>
             <a:lvl1pPr marL="0" indent="0">
               <a:buNone/>
-              <a:defRPr sz="2520" b="1"/>
+              <a:defRPr sz="1417" b="1"/>
             </a:lvl1pPr>
-            <a:lvl2pPr marL="479969" indent="0">
-              <a:buNone/>
-              <a:defRPr sz="2100" b="1"/>
+            <a:lvl2pPr marL="270022" indent="0">
+              <a:buNone/>
+              <a:defRPr sz="1181" b="1"/>
             </a:lvl2pPr>
-            <a:lvl3pPr marL="959937" indent="0">
-              <a:buNone/>
-              <a:defRPr sz="1890" b="1"/>
+            <a:lvl3pPr marL="540045" indent="0">
+              <a:buNone/>
+              <a:defRPr sz="1063" b="1"/>
             </a:lvl3pPr>
-            <a:lvl4pPr marL="1439906" indent="0">
-              <a:buNone/>
-              <a:defRPr sz="1680" b="1"/>
+            <a:lvl4pPr marL="810067" indent="0">
+              <a:buNone/>
+              <a:defRPr sz="945" b="1"/>
             </a:lvl4pPr>
-            <a:lvl5pPr marL="1919874" indent="0">
-              <a:buNone/>
-              <a:defRPr sz="1680" b="1"/>
+            <a:lvl5pPr marL="1080089" indent="0">
+              <a:buNone/>
+              <a:defRPr sz="945" b="1"/>
             </a:lvl5pPr>
-            <a:lvl6pPr marL="2399843" indent="0">
-              <a:buNone/>
-              <a:defRPr sz="1680" b="1"/>
+            <a:lvl6pPr marL="1350112" indent="0">
+              <a:buNone/>
+              <a:defRPr sz="945" b="1"/>
             </a:lvl6pPr>
-            <a:lvl7pPr marL="2879811" indent="0">
-              <a:buNone/>
-              <a:defRPr sz="1680" b="1"/>
+            <a:lvl7pPr marL="1620134" indent="0">
+              <a:buNone/>
+              <a:defRPr sz="945" b="1"/>
             </a:lvl7pPr>
-            <a:lvl8pPr marL="3359780" indent="0">
-              <a:buNone/>
-              <a:defRPr sz="1680" b="1"/>
+            <a:lvl8pPr marL="1890156" indent="0">
+              <a:buNone/>
+              <a:defRPr sz="945" b="1"/>
             </a:lvl8pPr>
-            <a:lvl9pPr marL="3839748" indent="0">
-              <a:buNone/>
-              <a:defRPr sz="1680" b="1"/>
+            <a:lvl9pPr marL="2160179" indent="0">
+              <a:buNone/>
+              <a:defRPr sz="945" b="1"/>
             </a:lvl9pPr>
           </a:lstStyle>
           <a:p>
@@ -1987,8 +1544,8 @@
         </p:nvSpPr>
         <p:spPr>
           <a:xfrm>
-            <a:off x="8747969" y="2629749"/>
-            <a:ext cx="7346224" cy="3867965"/>
+            <a:off x="2734093" y="3944915"/>
+            <a:ext cx="2295990" cy="5802372"/>
           </a:xfrm>
         </p:spPr>
         <p:txBody>
@@ -2049,7 +1606,7 @@
           <a:p>
             <a:fld id="{CA1BB51F-BFC6-4DD3-8C2A-5B21FD6F69C3}" type="datetimeFigureOut">
               <a:rPr lang="en-SE" smtClean="0"/>
-              <a:t>10/03/2023</a:t>
+              <a:t>10/17/2023</a:t>
             </a:fld>
             <a:endParaRPr lang="en-SE"/>
           </a:p>
@@ -2100,7 +1657,7 @@
     </p:spTree>
     <p:extLst>
       <p:ext uri="{BB962C8B-B14F-4D97-AF65-F5344CB8AC3E}">
-        <p14:creationId xmlns:p14="http://schemas.microsoft.com/office/powerpoint/2010/main" val="3062022536"/>
+        <p14:creationId xmlns:p14="http://schemas.microsoft.com/office/powerpoint/2010/main" val="3687527867"/>
       </p:ext>
     </p:extLst>
   </p:cSld>
@@ -2167,7 +1724,7 @@
           <a:p>
             <a:fld id="{CA1BB51F-BFC6-4DD3-8C2A-5B21FD6F69C3}" type="datetimeFigureOut">
               <a:rPr lang="en-SE" smtClean="0"/>
-              <a:t>10/03/2023</a:t>
+              <a:t>10/17/2023</a:t>
             </a:fld>
             <a:endParaRPr lang="en-SE"/>
           </a:p>
@@ -2218,7 +1775,7 @@
     </p:spTree>
     <p:extLst>
       <p:ext uri="{BB962C8B-B14F-4D97-AF65-F5344CB8AC3E}">
-        <p14:creationId xmlns:p14="http://schemas.microsoft.com/office/powerpoint/2010/main" val="1642528558"/>
+        <p14:creationId xmlns:p14="http://schemas.microsoft.com/office/powerpoint/2010/main" val="348244626"/>
       </p:ext>
     </p:extLst>
   </p:cSld>
@@ -2262,7 +1819,7 @@
           <a:p>
             <a:fld id="{CA1BB51F-BFC6-4DD3-8C2A-5B21FD6F69C3}" type="datetimeFigureOut">
               <a:rPr lang="en-SE" smtClean="0"/>
-              <a:t>10/03/2023</a:t>
+              <a:t>10/17/2023</a:t>
             </a:fld>
             <a:endParaRPr lang="en-SE"/>
           </a:p>
@@ -2313,7 +1870,7 @@
     </p:spTree>
     <p:extLst>
       <p:ext uri="{BB962C8B-B14F-4D97-AF65-F5344CB8AC3E}">
-        <p14:creationId xmlns:p14="http://schemas.microsoft.com/office/powerpoint/2010/main" val="2055848365"/>
+        <p14:creationId xmlns:p14="http://schemas.microsoft.com/office/powerpoint/2010/main" val="447692617"/>
       </p:ext>
     </p:extLst>
   </p:cSld>
@@ -2352,15 +1909,15 @@
         </p:nvSpPr>
         <p:spPr>
           <a:xfrm>
-            <a:off x="1190247" y="479954"/>
-            <a:ext cx="5573229" cy="1679840"/>
+            <a:off x="372001" y="719984"/>
+            <a:ext cx="1741858" cy="2519945"/>
           </a:xfrm>
         </p:spPr>
         <p:txBody>
           <a:bodyPr anchor="b"/>
           <a:lstStyle>
             <a:lvl1pPr>
-              <a:defRPr sz="3359"/>
+              <a:defRPr sz="1890"/>
             </a:lvl1pPr>
           </a:lstStyle>
           <a:p>
@@ -2384,39 +1941,39 @@
         </p:nvSpPr>
         <p:spPr>
           <a:xfrm>
-            <a:off x="7346224" y="1036569"/>
-            <a:ext cx="8747969" cy="5116178"/>
+            <a:off x="2295990" y="1554969"/>
+            <a:ext cx="2734092" cy="7674832"/>
           </a:xfrm>
         </p:spPr>
         <p:txBody>
           <a:bodyPr/>
           <a:lstStyle>
             <a:lvl1pPr>
-              <a:defRPr sz="3359"/>
+              <a:defRPr sz="1890"/>
             </a:lvl1pPr>
             <a:lvl2pPr>
-              <a:defRPr sz="2939"/>
+              <a:defRPr sz="1654"/>
             </a:lvl2pPr>
             <a:lvl3pPr>
-              <a:defRPr sz="2520"/>
+              <a:defRPr sz="1417"/>
             </a:lvl3pPr>
             <a:lvl4pPr>
-              <a:defRPr sz="2100"/>
+              <a:defRPr sz="1181"/>
             </a:lvl4pPr>
             <a:lvl5pPr>
-              <a:defRPr sz="2100"/>
+              <a:defRPr sz="1181"/>
             </a:lvl5pPr>
             <a:lvl6pPr>
-              <a:defRPr sz="2100"/>
+              <a:defRPr sz="1181"/>
             </a:lvl6pPr>
             <a:lvl7pPr>
-              <a:defRPr sz="2100"/>
+              <a:defRPr sz="1181"/>
             </a:lvl7pPr>
             <a:lvl8pPr>
-              <a:defRPr sz="2100"/>
+              <a:defRPr sz="1181"/>
             </a:lvl8pPr>
             <a:lvl9pPr>
-              <a:defRPr sz="2100"/>
+              <a:defRPr sz="1181"/>
             </a:lvl9pPr>
           </a:lstStyle>
           <a:p>
@@ -2469,8 +2026,8 @@
         </p:nvSpPr>
         <p:spPr>
           <a:xfrm>
-            <a:off x="1190247" y="2159794"/>
-            <a:ext cx="5573229" cy="4001285"/>
+            <a:off x="372001" y="3239930"/>
+            <a:ext cx="1741858" cy="6002369"/>
           </a:xfrm>
         </p:spPr>
         <p:txBody>
@@ -2478,39 +2035,39 @@
           <a:lstStyle>
             <a:lvl1pPr marL="0" indent="0">
               <a:buNone/>
-              <a:defRPr sz="1680"/>
+              <a:defRPr sz="945"/>
             </a:lvl1pPr>
-            <a:lvl2pPr marL="479969" indent="0">
-              <a:buNone/>
-              <a:defRPr sz="1470"/>
+            <a:lvl2pPr marL="270022" indent="0">
+              <a:buNone/>
+              <a:defRPr sz="827"/>
             </a:lvl2pPr>
-            <a:lvl3pPr marL="959937" indent="0">
-              <a:buNone/>
-              <a:defRPr sz="1260"/>
+            <a:lvl3pPr marL="540045" indent="0">
+              <a:buNone/>
+              <a:defRPr sz="709"/>
             </a:lvl3pPr>
-            <a:lvl4pPr marL="1439906" indent="0">
-              <a:buNone/>
-              <a:defRPr sz="1050"/>
+            <a:lvl4pPr marL="810067" indent="0">
+              <a:buNone/>
+              <a:defRPr sz="591"/>
             </a:lvl4pPr>
-            <a:lvl5pPr marL="1919874" indent="0">
-              <a:buNone/>
-              <a:defRPr sz="1050"/>
+            <a:lvl5pPr marL="1080089" indent="0">
+              <a:buNone/>
+              <a:defRPr sz="591"/>
             </a:lvl5pPr>
-            <a:lvl6pPr marL="2399843" indent="0">
-              <a:buNone/>
-              <a:defRPr sz="1050"/>
+            <a:lvl6pPr marL="1350112" indent="0">
+              <a:buNone/>
+              <a:defRPr sz="591"/>
             </a:lvl6pPr>
-            <a:lvl7pPr marL="2879811" indent="0">
-              <a:buNone/>
-              <a:defRPr sz="1050"/>
+            <a:lvl7pPr marL="1620134" indent="0">
+              <a:buNone/>
+              <a:defRPr sz="591"/>
             </a:lvl7pPr>
-            <a:lvl8pPr marL="3359780" indent="0">
-              <a:buNone/>
-              <a:defRPr sz="1050"/>
+            <a:lvl8pPr marL="1890156" indent="0">
+              <a:buNone/>
+              <a:defRPr sz="591"/>
             </a:lvl8pPr>
-            <a:lvl9pPr marL="3839748" indent="0">
-              <a:buNone/>
-              <a:defRPr sz="1050"/>
+            <a:lvl9pPr marL="2160179" indent="0">
+              <a:buNone/>
+              <a:defRPr sz="591"/>
             </a:lvl9pPr>
           </a:lstStyle>
           <a:p>
@@ -2539,7 +2096,7 @@
           <a:p>
             <a:fld id="{CA1BB51F-BFC6-4DD3-8C2A-5B21FD6F69C3}" type="datetimeFigureOut">
               <a:rPr lang="en-SE" smtClean="0"/>
-              <a:t>10/03/2023</a:t>
+              <a:t>10/17/2023</a:t>
             </a:fld>
             <a:endParaRPr lang="en-SE"/>
           </a:p>
@@ -2590,7 +2147,7 @@
     </p:spTree>
     <p:extLst>
       <p:ext uri="{BB962C8B-B14F-4D97-AF65-F5344CB8AC3E}">
-        <p14:creationId xmlns:p14="http://schemas.microsoft.com/office/powerpoint/2010/main" val="3639684718"/>
+        <p14:creationId xmlns:p14="http://schemas.microsoft.com/office/powerpoint/2010/main" val="1976301585"/>
       </p:ext>
     </p:extLst>
   </p:cSld>
@@ -2629,15 +2186,15 @@
         </p:nvSpPr>
         <p:spPr>
           <a:xfrm>
-            <a:off x="1190247" y="479954"/>
-            <a:ext cx="5573229" cy="1679840"/>
+            <a:off x="372001" y="719984"/>
+            <a:ext cx="1741858" cy="2519945"/>
           </a:xfrm>
         </p:spPr>
         <p:txBody>
           <a:bodyPr anchor="b"/>
           <a:lstStyle>
             <a:lvl1pPr>
-              <a:defRPr sz="3359"/>
+              <a:defRPr sz="1890"/>
             </a:lvl1pPr>
           </a:lstStyle>
           <a:p>
@@ -2661,8 +2218,8 @@
         </p:nvSpPr>
         <p:spPr>
           <a:xfrm>
-            <a:off x="7346224" y="1036569"/>
-            <a:ext cx="8747969" cy="5116178"/>
+            <a:off x="2295990" y="1554969"/>
+            <a:ext cx="2734092" cy="7674832"/>
           </a:xfrm>
         </p:spPr>
         <p:txBody>
@@ -2670,39 +2227,39 @@
           <a:lstStyle>
             <a:lvl1pPr marL="0" indent="0">
               <a:buNone/>
-              <a:defRPr sz="3359"/>
+              <a:defRPr sz="1890"/>
             </a:lvl1pPr>
-            <a:lvl2pPr marL="479969" indent="0">
-              <a:buNone/>
-              <a:defRPr sz="2939"/>
+            <a:lvl2pPr marL="270022" indent="0">
+              <a:buNone/>
+              <a:defRPr sz="1654"/>
             </a:lvl2pPr>
-            <a:lvl3pPr marL="959937" indent="0">
-              <a:buNone/>
-              <a:defRPr sz="2520"/>
+            <a:lvl3pPr marL="540045" indent="0">
+              <a:buNone/>
+              <a:defRPr sz="1417"/>
             </a:lvl3pPr>
-            <a:lvl4pPr marL="1439906" indent="0">
-              <a:buNone/>
-              <a:defRPr sz="2100"/>
+            <a:lvl4pPr marL="810067" indent="0">
+              <a:buNone/>
+              <a:defRPr sz="1181"/>
             </a:lvl4pPr>
-            <a:lvl5pPr marL="1919874" indent="0">
-              <a:buNone/>
-              <a:defRPr sz="2100"/>
+            <a:lvl5pPr marL="1080089" indent="0">
+              <a:buNone/>
+              <a:defRPr sz="1181"/>
             </a:lvl5pPr>
-            <a:lvl6pPr marL="2399843" indent="0">
-              <a:buNone/>
-              <a:defRPr sz="2100"/>
+            <a:lvl6pPr marL="1350112" indent="0">
+              <a:buNone/>
+              <a:defRPr sz="1181"/>
             </a:lvl6pPr>
-            <a:lvl7pPr marL="2879811" indent="0">
-              <a:buNone/>
-              <a:defRPr sz="2100"/>
+            <a:lvl7pPr marL="1620134" indent="0">
+              <a:buNone/>
+              <a:defRPr sz="1181"/>
             </a:lvl7pPr>
-            <a:lvl8pPr marL="3359780" indent="0">
-              <a:buNone/>
-              <a:defRPr sz="2100"/>
+            <a:lvl8pPr marL="1890156" indent="0">
+              <a:buNone/>
+              <a:defRPr sz="1181"/>
             </a:lvl8pPr>
-            <a:lvl9pPr marL="3839748" indent="0">
-              <a:buNone/>
-              <a:defRPr sz="2100"/>
+            <a:lvl9pPr marL="2160179" indent="0">
+              <a:buNone/>
+              <a:defRPr sz="1181"/>
             </a:lvl9pPr>
           </a:lstStyle>
           <a:p>
@@ -2726,8 +2283,8 @@
         </p:nvSpPr>
         <p:spPr>
           <a:xfrm>
-            <a:off x="1190247" y="2159794"/>
-            <a:ext cx="5573229" cy="4001285"/>
+            <a:off x="372001" y="3239930"/>
+            <a:ext cx="1741858" cy="6002369"/>
           </a:xfrm>
         </p:spPr>
         <p:txBody>
@@ -2735,39 +2292,39 @@
           <a:lstStyle>
             <a:lvl1pPr marL="0" indent="0">
               <a:buNone/>
-              <a:defRPr sz="1680"/>
+              <a:defRPr sz="945"/>
             </a:lvl1pPr>
-            <a:lvl2pPr marL="479969" indent="0">
-              <a:buNone/>
-              <a:defRPr sz="1470"/>
+            <a:lvl2pPr marL="270022" indent="0">
+              <a:buNone/>
+              <a:defRPr sz="827"/>
             </a:lvl2pPr>
-            <a:lvl3pPr marL="959937" indent="0">
-              <a:buNone/>
-              <a:defRPr sz="1260"/>
+            <a:lvl3pPr marL="540045" indent="0">
+              <a:buNone/>
+              <a:defRPr sz="709"/>
             </a:lvl3pPr>
-            <a:lvl4pPr marL="1439906" indent="0">
-              <a:buNone/>
-              <a:defRPr sz="1050"/>
+            <a:lvl4pPr marL="810067" indent="0">
+              <a:buNone/>
+              <a:defRPr sz="591"/>
             </a:lvl4pPr>
-            <a:lvl5pPr marL="1919874" indent="0">
-              <a:buNone/>
-              <a:defRPr sz="1050"/>
+            <a:lvl5pPr marL="1080089" indent="0">
+              <a:buNone/>
+              <a:defRPr sz="591"/>
             </a:lvl5pPr>
-            <a:lvl6pPr marL="2399843" indent="0">
-              <a:buNone/>
-              <a:defRPr sz="1050"/>
+            <a:lvl6pPr marL="1350112" indent="0">
+              <a:buNone/>
+              <a:defRPr sz="591"/>
             </a:lvl6pPr>
-            <a:lvl7pPr marL="2879811" indent="0">
-              <a:buNone/>
-              <a:defRPr sz="1050"/>
+            <a:lvl7pPr marL="1620134" indent="0">
+              <a:buNone/>
+              <a:defRPr sz="591"/>
             </a:lvl7pPr>
-            <a:lvl8pPr marL="3359780" indent="0">
-              <a:buNone/>
-              <a:defRPr sz="1050"/>
+            <a:lvl8pPr marL="1890156" indent="0">
+              <a:buNone/>
+              <a:defRPr sz="591"/>
             </a:lvl8pPr>
-            <a:lvl9pPr marL="3839748" indent="0">
-              <a:buNone/>
-              <a:defRPr sz="1050"/>
+            <a:lvl9pPr marL="2160179" indent="0">
+              <a:buNone/>
+              <a:defRPr sz="591"/>
             </a:lvl9pPr>
           </a:lstStyle>
           <a:p>
@@ -2796,7 +2353,7 @@
           <a:p>
             <a:fld id="{CA1BB51F-BFC6-4DD3-8C2A-5B21FD6F69C3}" type="datetimeFigureOut">
               <a:rPr lang="en-SE" smtClean="0"/>
-              <a:t>10/03/2023</a:t>
+              <a:t>10/17/2023</a:t>
             </a:fld>
             <a:endParaRPr lang="en-SE"/>
           </a:p>
@@ -2847,7 +2404,7 @@
     </p:spTree>
     <p:extLst>
       <p:ext uri="{BB962C8B-B14F-4D97-AF65-F5344CB8AC3E}">
-        <p14:creationId xmlns:p14="http://schemas.microsoft.com/office/powerpoint/2010/main" val="460076789"/>
+        <p14:creationId xmlns:p14="http://schemas.microsoft.com/office/powerpoint/2010/main" val="3508260045"/>
       </p:ext>
     </p:extLst>
   </p:cSld>
@@ -2891,8 +2448,8 @@
         </p:nvSpPr>
         <p:spPr>
           <a:xfrm>
-            <a:off x="1187996" y="383297"/>
-            <a:ext cx="14903947" cy="1391534"/>
+            <a:off x="371297" y="574991"/>
+            <a:ext cx="4658083" cy="2087454"/>
           </a:xfrm>
           <a:prstGeom prst="rect">
             <a:avLst/>
@@ -2924,8 +2481,8 @@
         </p:nvSpPr>
         <p:spPr>
           <a:xfrm>
-            <a:off x="1187996" y="1916484"/>
-            <a:ext cx="14903947" cy="4567898"/>
+            <a:off x="371297" y="2874937"/>
+            <a:ext cx="4658083" cy="6852350"/>
           </a:xfrm>
           <a:prstGeom prst="rect">
             <a:avLst/>
@@ -2986,8 +2543,8 @@
         </p:nvSpPr>
         <p:spPr>
           <a:xfrm>
-            <a:off x="1187996" y="6672697"/>
-            <a:ext cx="3887986" cy="383297"/>
+            <a:off x="371298" y="10009783"/>
+            <a:ext cx="1215151" cy="574988"/>
           </a:xfrm>
           <a:prstGeom prst="rect">
             <a:avLst/>
@@ -2997,7 +2554,7 @@
           <a:bodyPr vert="horz" lIns="91440" tIns="45720" rIns="91440" bIns="45720" rtlCol="0" anchor="ctr"/>
           <a:lstStyle>
             <a:lvl1pPr algn="l">
-              <a:defRPr sz="1260">
+              <a:defRPr sz="709">
                 <a:solidFill>
                   <a:schemeClr val="tx1">
                     <a:tint val="75000"/>
@@ -3009,7 +2566,7 @@
           <a:p>
             <a:fld id="{CA1BB51F-BFC6-4DD3-8C2A-5B21FD6F69C3}" type="datetimeFigureOut">
               <a:rPr lang="en-SE" smtClean="0"/>
-              <a:t>10/03/2023</a:t>
+              <a:t>10/17/2023</a:t>
             </a:fld>
             <a:endParaRPr lang="en-SE"/>
           </a:p>
@@ -3027,8 +2584,8 @@
         </p:nvSpPr>
         <p:spPr>
           <a:xfrm>
-            <a:off x="5723980" y="6672697"/>
-            <a:ext cx="5831979" cy="383297"/>
+            <a:off x="1788975" y="10009783"/>
+            <a:ext cx="1822728" cy="574988"/>
           </a:xfrm>
           <a:prstGeom prst="rect">
             <a:avLst/>
@@ -3038,7 +2595,7 @@
           <a:bodyPr vert="horz" lIns="91440" tIns="45720" rIns="91440" bIns="45720" rtlCol="0" anchor="ctr"/>
           <a:lstStyle>
             <a:lvl1pPr algn="ctr">
-              <a:defRPr sz="1260">
+              <a:defRPr sz="709">
                 <a:solidFill>
                   <a:schemeClr val="tx1">
                     <a:tint val="75000"/>
@@ -3064,8 +2621,8 @@
         </p:nvSpPr>
         <p:spPr>
           <a:xfrm>
-            <a:off x="12203956" y="6672697"/>
-            <a:ext cx="3887986" cy="383297"/>
+            <a:off x="3814228" y="10009783"/>
+            <a:ext cx="1215151" cy="574988"/>
           </a:xfrm>
           <a:prstGeom prst="rect">
             <a:avLst/>
@@ -3075,7 +2632,7 @@
           <a:bodyPr vert="horz" lIns="91440" tIns="45720" rIns="91440" bIns="45720" rtlCol="0" anchor="ctr"/>
           <a:lstStyle>
             <a:lvl1pPr algn="r">
-              <a:defRPr sz="1260">
+              <a:defRPr sz="709">
                 <a:solidFill>
                   <a:schemeClr val="tx1">
                     <a:tint val="75000"/>
@@ -3096,27 +2653,27 @@
     </p:spTree>
     <p:extLst>
       <p:ext uri="{BB962C8B-B14F-4D97-AF65-F5344CB8AC3E}">
-        <p14:creationId xmlns:p14="http://schemas.microsoft.com/office/powerpoint/2010/main" val="1920241680"/>
+        <p14:creationId xmlns:p14="http://schemas.microsoft.com/office/powerpoint/2010/main" val="4043418553"/>
       </p:ext>
     </p:extLst>
   </p:cSld>
   <p:clrMap bg1="lt1" tx1="dk1" bg2="lt2" tx2="dk2" accent1="accent1" accent2="accent2" accent3="accent3" accent4="accent4" accent5="accent5" accent6="accent6" hlink="hlink" folHlink="folHlink"/>
   <p:sldLayoutIdLst>
-    <p:sldLayoutId id="2147483865" r:id="rId1"/>
-    <p:sldLayoutId id="2147483866" r:id="rId2"/>
-    <p:sldLayoutId id="2147483867" r:id="rId3"/>
-    <p:sldLayoutId id="2147483868" r:id="rId4"/>
-    <p:sldLayoutId id="2147483869" r:id="rId5"/>
-    <p:sldLayoutId id="2147483870" r:id="rId6"/>
-    <p:sldLayoutId id="2147483871" r:id="rId7"/>
-    <p:sldLayoutId id="2147483872" r:id="rId8"/>
-    <p:sldLayoutId id="2147483873" r:id="rId9"/>
-    <p:sldLayoutId id="2147483874" r:id="rId10"/>
-    <p:sldLayoutId id="2147483875" r:id="rId11"/>
+    <p:sldLayoutId id="2147483721" r:id="rId1"/>
+    <p:sldLayoutId id="2147483722" r:id="rId2"/>
+    <p:sldLayoutId id="2147483723" r:id="rId3"/>
+    <p:sldLayoutId id="2147483724" r:id="rId4"/>
+    <p:sldLayoutId id="2147483725" r:id="rId5"/>
+    <p:sldLayoutId id="2147483726" r:id="rId6"/>
+    <p:sldLayoutId id="2147483727" r:id="rId7"/>
+    <p:sldLayoutId id="2147483728" r:id="rId8"/>
+    <p:sldLayoutId id="2147483729" r:id="rId9"/>
+    <p:sldLayoutId id="2147483730" r:id="rId10"/>
+    <p:sldLayoutId id="2147483731" r:id="rId11"/>
   </p:sldLayoutIdLst>
   <p:txStyles>
     <p:titleStyle>
-      <a:lvl1pPr algn="l" defTabSz="959937" rtl="0" eaLnBrk="1" latinLnBrk="0" hangingPunct="1">
+      <a:lvl1pPr algn="l" defTabSz="540045" rtl="0" eaLnBrk="1" latinLnBrk="0" hangingPunct="1">
         <a:lnSpc>
           <a:spcPct val="90000"/>
         </a:lnSpc>
@@ -3124,7 +2681,7 @@
           <a:spcPct val="0"/>
         </a:spcBef>
         <a:buNone/>
-        <a:defRPr sz="4619" kern="1200">
+        <a:defRPr sz="2599" kern="1200">
           <a:solidFill>
             <a:schemeClr val="tx1"/>
           </a:solidFill>
@@ -3135,16 +2692,16 @@
       </a:lvl1pPr>
     </p:titleStyle>
     <p:bodyStyle>
-      <a:lvl1pPr marL="239984" indent="-239984" algn="l" defTabSz="959937" rtl="0" eaLnBrk="1" latinLnBrk="0" hangingPunct="1">
+      <a:lvl1pPr marL="135011" indent="-135011" algn="l" defTabSz="540045" rtl="0" eaLnBrk="1" latinLnBrk="0" hangingPunct="1">
         <a:lnSpc>
           <a:spcPct val="90000"/>
         </a:lnSpc>
         <a:spcBef>
-          <a:spcPts val="1050"/>
+          <a:spcPts val="591"/>
         </a:spcBef>
         <a:buFont typeface="Arial" panose="020B0604020202020204" pitchFamily="34" charset="0"/>
         <a:buChar char="•"/>
-        <a:defRPr sz="2939" kern="1200">
+        <a:defRPr sz="1654" kern="1200">
           <a:solidFill>
             <a:schemeClr val="tx1"/>
           </a:solidFill>
@@ -3153,16 +2710,16 @@
           <a:cs typeface="+mn-cs"/>
         </a:defRPr>
       </a:lvl1pPr>
-      <a:lvl2pPr marL="719953" indent="-239984" algn="l" defTabSz="959937" rtl="0" eaLnBrk="1" latinLnBrk="0" hangingPunct="1">
+      <a:lvl2pPr marL="405033" indent="-135011" algn="l" defTabSz="540045" rtl="0" eaLnBrk="1" latinLnBrk="0" hangingPunct="1">
         <a:lnSpc>
           <a:spcPct val="90000"/>
         </a:lnSpc>
         <a:spcBef>
-          <a:spcPts val="525"/>
+          <a:spcPts val="295"/>
         </a:spcBef>
         <a:buFont typeface="Arial" panose="020B0604020202020204" pitchFamily="34" charset="0"/>
         <a:buChar char="•"/>
-        <a:defRPr sz="2520" kern="1200">
+        <a:defRPr sz="1417" kern="1200">
           <a:solidFill>
             <a:schemeClr val="tx1"/>
           </a:solidFill>
@@ -3171,16 +2728,16 @@
           <a:cs typeface="+mn-cs"/>
         </a:defRPr>
       </a:lvl2pPr>
-      <a:lvl3pPr marL="1199921" indent="-239984" algn="l" defTabSz="959937" rtl="0" eaLnBrk="1" latinLnBrk="0" hangingPunct="1">
+      <a:lvl3pPr marL="675056" indent="-135011" algn="l" defTabSz="540045" rtl="0" eaLnBrk="1" latinLnBrk="0" hangingPunct="1">
         <a:lnSpc>
           <a:spcPct val="90000"/>
         </a:lnSpc>
         <a:spcBef>
-          <a:spcPts val="525"/>
+          <a:spcPts val="295"/>
         </a:spcBef>
         <a:buFont typeface="Arial" panose="020B0604020202020204" pitchFamily="34" charset="0"/>
         <a:buChar char="•"/>
-        <a:defRPr sz="2100" kern="1200">
+        <a:defRPr sz="1181" kern="1200">
           <a:solidFill>
             <a:schemeClr val="tx1"/>
           </a:solidFill>
@@ -3189,16 +2746,16 @@
           <a:cs typeface="+mn-cs"/>
         </a:defRPr>
       </a:lvl3pPr>
-      <a:lvl4pPr marL="1679890" indent="-239984" algn="l" defTabSz="959937" rtl="0" eaLnBrk="1" latinLnBrk="0" hangingPunct="1">
+      <a:lvl4pPr marL="945078" indent="-135011" algn="l" defTabSz="540045" rtl="0" eaLnBrk="1" latinLnBrk="0" hangingPunct="1">
         <a:lnSpc>
           <a:spcPct val="90000"/>
         </a:lnSpc>
         <a:spcBef>
-          <a:spcPts val="525"/>
+          <a:spcPts val="295"/>
         </a:spcBef>
         <a:buFont typeface="Arial" panose="020B0604020202020204" pitchFamily="34" charset="0"/>
         <a:buChar char="•"/>
-        <a:defRPr sz="1890" kern="1200">
+        <a:defRPr sz="1063" kern="1200">
           <a:solidFill>
             <a:schemeClr val="tx1"/>
           </a:solidFill>
@@ -3207,16 +2764,16 @@
           <a:cs typeface="+mn-cs"/>
         </a:defRPr>
       </a:lvl4pPr>
-      <a:lvl5pPr marL="2159859" indent="-239984" algn="l" defTabSz="959937" rtl="0" eaLnBrk="1" latinLnBrk="0" hangingPunct="1">
+      <a:lvl5pPr marL="1215100" indent="-135011" algn="l" defTabSz="540045" rtl="0" eaLnBrk="1" latinLnBrk="0" hangingPunct="1">
         <a:lnSpc>
           <a:spcPct val="90000"/>
         </a:lnSpc>
         <a:spcBef>
-          <a:spcPts val="525"/>
+          <a:spcPts val="295"/>
         </a:spcBef>
         <a:buFont typeface="Arial" panose="020B0604020202020204" pitchFamily="34" charset="0"/>
         <a:buChar char="•"/>
-        <a:defRPr sz="1890" kern="1200">
+        <a:defRPr sz="1063" kern="1200">
           <a:solidFill>
             <a:schemeClr val="tx1"/>
           </a:solidFill>
@@ -3225,16 +2782,16 @@
           <a:cs typeface="+mn-cs"/>
         </a:defRPr>
       </a:lvl5pPr>
-      <a:lvl6pPr marL="2639827" indent="-239984" algn="l" defTabSz="959937" rtl="0" eaLnBrk="1" latinLnBrk="0" hangingPunct="1">
+      <a:lvl6pPr marL="1485123" indent="-135011" algn="l" defTabSz="540045" rtl="0" eaLnBrk="1" latinLnBrk="0" hangingPunct="1">
         <a:lnSpc>
           <a:spcPct val="90000"/>
         </a:lnSpc>
         <a:spcBef>
-          <a:spcPts val="525"/>
+          <a:spcPts val="295"/>
         </a:spcBef>
         <a:buFont typeface="Arial" panose="020B0604020202020204" pitchFamily="34" charset="0"/>
         <a:buChar char="•"/>
-        <a:defRPr sz="1890" kern="1200">
+        <a:defRPr sz="1063" kern="1200">
           <a:solidFill>
             <a:schemeClr val="tx1"/>
           </a:solidFill>
@@ -3243,16 +2800,16 @@
           <a:cs typeface="+mn-cs"/>
         </a:defRPr>
       </a:lvl6pPr>
-      <a:lvl7pPr marL="3119796" indent="-239984" algn="l" defTabSz="959937" rtl="0" eaLnBrk="1" latinLnBrk="0" hangingPunct="1">
+      <a:lvl7pPr marL="1755145" indent="-135011" algn="l" defTabSz="540045" rtl="0" eaLnBrk="1" latinLnBrk="0" hangingPunct="1">
         <a:lnSpc>
           <a:spcPct val="90000"/>
         </a:lnSpc>
         <a:spcBef>
-          <a:spcPts val="525"/>
+          <a:spcPts val="295"/>
         </a:spcBef>
         <a:buFont typeface="Arial" panose="020B0604020202020204" pitchFamily="34" charset="0"/>
         <a:buChar char="•"/>
-        <a:defRPr sz="1890" kern="1200">
+        <a:defRPr sz="1063" kern="1200">
           <a:solidFill>
             <a:schemeClr val="tx1"/>
           </a:solidFill>
@@ -3261,16 +2818,16 @@
           <a:cs typeface="+mn-cs"/>
         </a:defRPr>
       </a:lvl7pPr>
-      <a:lvl8pPr marL="3599764" indent="-239984" algn="l" defTabSz="959937" rtl="0" eaLnBrk="1" latinLnBrk="0" hangingPunct="1">
+      <a:lvl8pPr marL="2025167" indent="-135011" algn="l" defTabSz="540045" rtl="0" eaLnBrk="1" latinLnBrk="0" hangingPunct="1">
         <a:lnSpc>
           <a:spcPct val="90000"/>
         </a:lnSpc>
         <a:spcBef>
-          <a:spcPts val="525"/>
+          <a:spcPts val="295"/>
         </a:spcBef>
         <a:buFont typeface="Arial" panose="020B0604020202020204" pitchFamily="34" charset="0"/>
         <a:buChar char="•"/>
-        <a:defRPr sz="1890" kern="1200">
+        <a:defRPr sz="1063" kern="1200">
           <a:solidFill>
             <a:schemeClr val="tx1"/>
           </a:solidFill>
@@ -3279,16 +2836,16 @@
           <a:cs typeface="+mn-cs"/>
         </a:defRPr>
       </a:lvl8pPr>
-      <a:lvl9pPr marL="4079733" indent="-239984" algn="l" defTabSz="959937" rtl="0" eaLnBrk="1" latinLnBrk="0" hangingPunct="1">
+      <a:lvl9pPr marL="2295190" indent="-135011" algn="l" defTabSz="540045" rtl="0" eaLnBrk="1" latinLnBrk="0" hangingPunct="1">
         <a:lnSpc>
           <a:spcPct val="90000"/>
         </a:lnSpc>
         <a:spcBef>
-          <a:spcPts val="525"/>
+          <a:spcPts val="295"/>
         </a:spcBef>
         <a:buFont typeface="Arial" panose="020B0604020202020204" pitchFamily="34" charset="0"/>
         <a:buChar char="•"/>
-        <a:defRPr sz="1890" kern="1200">
+        <a:defRPr sz="1063" kern="1200">
           <a:solidFill>
             <a:schemeClr val="tx1"/>
           </a:solidFill>
@@ -3302,8 +2859,8 @@
       <a:defPPr>
         <a:defRPr lang="en-US"/>
       </a:defPPr>
-      <a:lvl1pPr marL="0" algn="l" defTabSz="959937" rtl="0" eaLnBrk="1" latinLnBrk="0" hangingPunct="1">
-        <a:defRPr sz="1890" kern="1200">
+      <a:lvl1pPr marL="0" algn="l" defTabSz="540045" rtl="0" eaLnBrk="1" latinLnBrk="0" hangingPunct="1">
+        <a:defRPr sz="1063" kern="1200">
           <a:solidFill>
             <a:schemeClr val="tx1"/>
           </a:solidFill>
@@ -3312,8 +2869,8 @@
           <a:cs typeface="+mn-cs"/>
         </a:defRPr>
       </a:lvl1pPr>
-      <a:lvl2pPr marL="479969" algn="l" defTabSz="959937" rtl="0" eaLnBrk="1" latinLnBrk="0" hangingPunct="1">
-        <a:defRPr sz="1890" kern="1200">
+      <a:lvl2pPr marL="270022" algn="l" defTabSz="540045" rtl="0" eaLnBrk="1" latinLnBrk="0" hangingPunct="1">
+        <a:defRPr sz="1063" kern="1200">
           <a:solidFill>
             <a:schemeClr val="tx1"/>
           </a:solidFill>
@@ -3322,8 +2879,8 @@
           <a:cs typeface="+mn-cs"/>
         </a:defRPr>
       </a:lvl2pPr>
-      <a:lvl3pPr marL="959937" algn="l" defTabSz="959937" rtl="0" eaLnBrk="1" latinLnBrk="0" hangingPunct="1">
-        <a:defRPr sz="1890" kern="1200">
+      <a:lvl3pPr marL="540045" algn="l" defTabSz="540045" rtl="0" eaLnBrk="1" latinLnBrk="0" hangingPunct="1">
+        <a:defRPr sz="1063" kern="1200">
           <a:solidFill>
             <a:schemeClr val="tx1"/>
           </a:solidFill>
@@ -3332,8 +2889,8 @@
           <a:cs typeface="+mn-cs"/>
         </a:defRPr>
       </a:lvl3pPr>
-      <a:lvl4pPr marL="1439906" algn="l" defTabSz="959937" rtl="0" eaLnBrk="1" latinLnBrk="0" hangingPunct="1">
-        <a:defRPr sz="1890" kern="1200">
+      <a:lvl4pPr marL="810067" algn="l" defTabSz="540045" rtl="0" eaLnBrk="1" latinLnBrk="0" hangingPunct="1">
+        <a:defRPr sz="1063" kern="1200">
           <a:solidFill>
             <a:schemeClr val="tx1"/>
           </a:solidFill>
@@ -3342,8 +2899,8 @@
           <a:cs typeface="+mn-cs"/>
         </a:defRPr>
       </a:lvl4pPr>
-      <a:lvl5pPr marL="1919874" algn="l" defTabSz="959937" rtl="0" eaLnBrk="1" latinLnBrk="0" hangingPunct="1">
-        <a:defRPr sz="1890" kern="1200">
+      <a:lvl5pPr marL="1080089" algn="l" defTabSz="540045" rtl="0" eaLnBrk="1" latinLnBrk="0" hangingPunct="1">
+        <a:defRPr sz="1063" kern="1200">
           <a:solidFill>
             <a:schemeClr val="tx1"/>
           </a:solidFill>
@@ -3352,8 +2909,8 @@
           <a:cs typeface="+mn-cs"/>
         </a:defRPr>
       </a:lvl5pPr>
-      <a:lvl6pPr marL="2399843" algn="l" defTabSz="959937" rtl="0" eaLnBrk="1" latinLnBrk="0" hangingPunct="1">
-        <a:defRPr sz="1890" kern="1200">
+      <a:lvl6pPr marL="1350112" algn="l" defTabSz="540045" rtl="0" eaLnBrk="1" latinLnBrk="0" hangingPunct="1">
+        <a:defRPr sz="1063" kern="1200">
           <a:solidFill>
             <a:schemeClr val="tx1"/>
           </a:solidFill>
@@ -3362,8 +2919,8 @@
           <a:cs typeface="+mn-cs"/>
         </a:defRPr>
       </a:lvl6pPr>
-      <a:lvl7pPr marL="2879811" algn="l" defTabSz="959937" rtl="0" eaLnBrk="1" latinLnBrk="0" hangingPunct="1">
-        <a:defRPr sz="1890" kern="1200">
+      <a:lvl7pPr marL="1620134" algn="l" defTabSz="540045" rtl="0" eaLnBrk="1" latinLnBrk="0" hangingPunct="1">
+        <a:defRPr sz="1063" kern="1200">
           <a:solidFill>
             <a:schemeClr val="tx1"/>
           </a:solidFill>
@@ -3372,8 +2929,8 @@
           <a:cs typeface="+mn-cs"/>
         </a:defRPr>
       </a:lvl7pPr>
-      <a:lvl8pPr marL="3359780" algn="l" defTabSz="959937" rtl="0" eaLnBrk="1" latinLnBrk="0" hangingPunct="1">
-        <a:defRPr sz="1890" kern="1200">
+      <a:lvl8pPr marL="1890156" algn="l" defTabSz="540045" rtl="0" eaLnBrk="1" latinLnBrk="0" hangingPunct="1">
+        <a:defRPr sz="1063" kern="1200">
           <a:solidFill>
             <a:schemeClr val="tx1"/>
           </a:solidFill>
@@ -3382,8 +2939,8 @@
           <a:cs typeface="+mn-cs"/>
         </a:defRPr>
       </a:lvl8pPr>
-      <a:lvl9pPr marL="3839748" algn="l" defTabSz="959937" rtl="0" eaLnBrk="1" latinLnBrk="0" hangingPunct="1">
-        <a:defRPr sz="1890" kern="1200">
+      <a:lvl9pPr marL="2160179" algn="l" defTabSz="540045" rtl="0" eaLnBrk="1" latinLnBrk="0" hangingPunct="1">
+        <a:defRPr sz="1063" kern="1200">
           <a:solidFill>
             <a:schemeClr val="tx1"/>
           </a:solidFill>
@@ -3419,7 +2976,7 @@
           <p:cNvPr id="4" name="图片 3">
             <a:extLst>
               <a:ext uri="{FF2B5EF4-FFF2-40B4-BE49-F238E27FC236}">
-                <a16:creationId xmlns:a16="http://schemas.microsoft.com/office/drawing/2014/main" id="{9C80E4C5-E437-FA88-0C87-8F2F8D5E9C9F}"/>
+                <a16:creationId xmlns:a16="http://schemas.microsoft.com/office/drawing/2014/main" id="{83120377-C37F-1771-E0EA-E31032E69CBF}"/>
               </a:ext>
             </a:extLst>
           </p:cNvPr>
@@ -3429,348 +2986,21 @@
           <p:nvPr/>
         </p:nvPicPr>
         <p:blipFill>
-          <a:blip r:embed="rId3"/>
+          <a:blip r:embed="rId2"/>
           <a:stretch>
             <a:fillRect/>
           </a:stretch>
         </p:blipFill>
         <p:spPr>
           <a:xfrm>
-            <a:off x="3087998" y="671067"/>
-            <a:ext cx="12785606" cy="6292107"/>
+            <a:off x="791686" y="-622"/>
+            <a:ext cx="4003040" cy="10800385"/>
           </a:xfrm>
           <a:prstGeom prst="rect">
             <a:avLst/>
           </a:prstGeom>
         </p:spPr>
       </p:pic>
-      <p:pic>
-        <p:nvPicPr>
-          <p:cNvPr id="3" name="图片 2">
-            <a:extLst>
-              <a:ext uri="{FF2B5EF4-FFF2-40B4-BE49-F238E27FC236}">
-                <a16:creationId xmlns:a16="http://schemas.microsoft.com/office/drawing/2014/main" id="{5C4A27EF-BC52-E514-C164-E8D16BB1C38B}"/>
-              </a:ext>
-            </a:extLst>
-          </p:cNvPr>
-          <p:cNvPicPr>
-            <a:picLocks noChangeAspect="1"/>
-          </p:cNvPicPr>
-          <p:nvPr/>
-        </p:nvPicPr>
-        <p:blipFill rotWithShape="1">
-          <a:blip r:embed="rId4"/>
-          <a:srcRect b="23791"/>
-          <a:stretch/>
-        </p:blipFill>
-        <p:spPr>
-          <a:xfrm>
-            <a:off x="2" y="660788"/>
-            <a:ext cx="3087999" cy="6292106"/>
-          </a:xfrm>
-          <a:prstGeom prst="rect">
-            <a:avLst/>
-          </a:prstGeom>
-        </p:spPr>
-      </p:pic>
-      <p:sp>
-        <p:nvSpPr>
-          <p:cNvPr id="6" name="Oval 19">
-            <a:extLst>
-              <a:ext uri="{FF2B5EF4-FFF2-40B4-BE49-F238E27FC236}">
-                <a16:creationId xmlns:a16="http://schemas.microsoft.com/office/drawing/2014/main" id="{07DE66C5-A761-67E9-A099-71C9FB0DF8D2}"/>
-              </a:ext>
-            </a:extLst>
-          </p:cNvPr>
-          <p:cNvSpPr>
-            <a:spLocks noChangeAspect="1"/>
-          </p:cNvSpPr>
-          <p:nvPr/>
-        </p:nvSpPr>
-        <p:spPr>
-          <a:xfrm>
-            <a:off x="0" y="0"/>
-            <a:ext cx="648000" cy="648000"/>
-          </a:xfrm>
-          <a:prstGeom prst="ellipse">
-            <a:avLst/>
-          </a:prstGeom>
-          <a:solidFill>
-            <a:srgbClr val="F79647"/>
-          </a:solidFill>
-          <a:ln>
-            <a:noFill/>
-          </a:ln>
-        </p:spPr>
-        <p:style>
-          <a:lnRef idx="2">
-            <a:schemeClr val="accent1">
-              <a:shade val="15000"/>
-            </a:schemeClr>
-          </a:lnRef>
-          <a:fillRef idx="1">
-            <a:schemeClr val="accent1"/>
-          </a:fillRef>
-          <a:effectRef idx="0">
-            <a:schemeClr val="accent1"/>
-          </a:effectRef>
-          <a:fontRef idx="minor">
-            <a:schemeClr val="lt1"/>
-          </a:fontRef>
-        </p:style>
-        <p:txBody>
-          <a:bodyPr tIns="135888" bIns="203836" rtlCol="0" anchor="ctr"/>
-          <a:lstStyle/>
-          <a:p>
-            <a:pPr algn="ctr"/>
-            <a:r>
-              <a:rPr lang="en-GB" sz="3500" dirty="0">
-                <a:latin typeface="Arial" panose="020B0604020202020204" pitchFamily="34" charset="0"/>
-                <a:cs typeface="Arial" panose="020B0604020202020204" pitchFamily="34" charset="0"/>
-              </a:rPr>
-              <a:t>a</a:t>
-            </a:r>
-            <a:endParaRPr lang="en-SE" sz="3500" dirty="0">
-              <a:latin typeface="Arial" panose="020B0604020202020204" pitchFamily="34" charset="0"/>
-              <a:cs typeface="Arial" panose="020B0604020202020204" pitchFamily="34" charset="0"/>
-            </a:endParaRPr>
-          </a:p>
-        </p:txBody>
-      </p:sp>
-      <p:sp>
-        <p:nvSpPr>
-          <p:cNvPr id="7" name="Oval 19">
-            <a:extLst>
-              <a:ext uri="{FF2B5EF4-FFF2-40B4-BE49-F238E27FC236}">
-                <a16:creationId xmlns:a16="http://schemas.microsoft.com/office/drawing/2014/main" id="{C0309A75-AC89-7519-6523-08C70D52654C}"/>
-              </a:ext>
-            </a:extLst>
-          </p:cNvPr>
-          <p:cNvSpPr>
-            <a:spLocks noChangeAspect="1"/>
-          </p:cNvSpPr>
-          <p:nvPr/>
-        </p:nvSpPr>
-        <p:spPr>
-          <a:xfrm>
-            <a:off x="6129768" y="0"/>
-            <a:ext cx="648000" cy="648000"/>
-          </a:xfrm>
-          <a:prstGeom prst="ellipse">
-            <a:avLst/>
-          </a:prstGeom>
-          <a:solidFill>
-            <a:srgbClr val="F79647"/>
-          </a:solidFill>
-          <a:ln>
-            <a:noFill/>
-          </a:ln>
-        </p:spPr>
-        <p:style>
-          <a:lnRef idx="2">
-            <a:schemeClr val="accent1">
-              <a:shade val="15000"/>
-            </a:schemeClr>
-          </a:lnRef>
-          <a:fillRef idx="1">
-            <a:schemeClr val="accent1"/>
-          </a:fillRef>
-          <a:effectRef idx="0">
-            <a:schemeClr val="accent1"/>
-          </a:effectRef>
-          <a:fontRef idx="minor">
-            <a:schemeClr val="lt1"/>
-          </a:fontRef>
-        </p:style>
-        <p:txBody>
-          <a:bodyPr tIns="135888" bIns="203836" rtlCol="0" anchor="ctr"/>
-          <a:lstStyle/>
-          <a:p>
-            <a:pPr algn="ctr"/>
-            <a:r>
-              <a:rPr lang="en-GB" sz="3500" dirty="0">
-                <a:latin typeface="Arial" panose="020B0604020202020204" pitchFamily="34" charset="0"/>
-                <a:cs typeface="Arial" panose="020B0604020202020204" pitchFamily="34" charset="0"/>
-              </a:rPr>
-              <a:t>c</a:t>
-            </a:r>
-            <a:endParaRPr lang="en-SE" sz="3500" dirty="0">
-              <a:latin typeface="Arial" panose="020B0604020202020204" pitchFamily="34" charset="0"/>
-              <a:cs typeface="Arial" panose="020B0604020202020204" pitchFamily="34" charset="0"/>
-            </a:endParaRPr>
-          </a:p>
-        </p:txBody>
-      </p:sp>
-      <p:sp>
-        <p:nvSpPr>
-          <p:cNvPr id="8" name="Oval 19">
-            <a:extLst>
-              <a:ext uri="{FF2B5EF4-FFF2-40B4-BE49-F238E27FC236}">
-                <a16:creationId xmlns:a16="http://schemas.microsoft.com/office/drawing/2014/main" id="{49BD15E2-0B01-1BBB-3BE0-2B05ABEA1433}"/>
-              </a:ext>
-            </a:extLst>
-          </p:cNvPr>
-          <p:cNvSpPr>
-            <a:spLocks noChangeAspect="1"/>
-          </p:cNvSpPr>
-          <p:nvPr/>
-        </p:nvSpPr>
-        <p:spPr>
-          <a:xfrm>
-            <a:off x="3064884" y="0"/>
-            <a:ext cx="648000" cy="648000"/>
-          </a:xfrm>
-          <a:prstGeom prst="ellipse">
-            <a:avLst/>
-          </a:prstGeom>
-          <a:solidFill>
-            <a:srgbClr val="F79647"/>
-          </a:solidFill>
-          <a:ln>
-            <a:noFill/>
-          </a:ln>
-        </p:spPr>
-        <p:style>
-          <a:lnRef idx="2">
-            <a:schemeClr val="accent1">
-              <a:shade val="15000"/>
-            </a:schemeClr>
-          </a:lnRef>
-          <a:fillRef idx="1">
-            <a:schemeClr val="accent1"/>
-          </a:fillRef>
-          <a:effectRef idx="0">
-            <a:schemeClr val="accent1"/>
-          </a:effectRef>
-          <a:fontRef idx="minor">
-            <a:schemeClr val="lt1"/>
-          </a:fontRef>
-        </p:style>
-        <p:txBody>
-          <a:bodyPr tIns="135888" bIns="203836" rtlCol="0" anchor="ctr"/>
-          <a:lstStyle/>
-          <a:p>
-            <a:pPr algn="ctr"/>
-            <a:r>
-              <a:rPr lang="en-GB" sz="3500" dirty="0">
-                <a:latin typeface="Arial" panose="020B0604020202020204" pitchFamily="34" charset="0"/>
-                <a:cs typeface="Arial" panose="020B0604020202020204" pitchFamily="34" charset="0"/>
-              </a:rPr>
-              <a:t>b</a:t>
-            </a:r>
-            <a:endParaRPr lang="en-SE" sz="3500" dirty="0">
-              <a:latin typeface="Arial" panose="020B0604020202020204" pitchFamily="34" charset="0"/>
-              <a:cs typeface="Arial" panose="020B0604020202020204" pitchFamily="34" charset="0"/>
-            </a:endParaRPr>
-          </a:p>
-        </p:txBody>
-      </p:sp>
-      <p:sp>
-        <p:nvSpPr>
-          <p:cNvPr id="10" name="Rectangle 22">
-            <a:extLst>
-              <a:ext uri="{FF2B5EF4-FFF2-40B4-BE49-F238E27FC236}">
-                <a16:creationId xmlns:a16="http://schemas.microsoft.com/office/drawing/2014/main" id="{017E72BE-3C82-A614-168E-81E8EFE1BDD1}"/>
-              </a:ext>
-            </a:extLst>
-          </p:cNvPr>
-          <p:cNvSpPr/>
-          <p:nvPr/>
-        </p:nvSpPr>
-        <p:spPr>
-          <a:xfrm>
-            <a:off x="87089" y="3388891"/>
-            <a:ext cx="2781949" cy="550672"/>
-          </a:xfrm>
-          <a:prstGeom prst="rect">
-            <a:avLst/>
-          </a:prstGeom>
-          <a:noFill/>
-          <a:ln w="28575">
-            <a:solidFill>
-              <a:srgbClr val="F79647"/>
-            </a:solidFill>
-            <a:prstDash val="sysDot"/>
-          </a:ln>
-        </p:spPr>
-        <p:style>
-          <a:lnRef idx="2">
-            <a:schemeClr val="accent1">
-              <a:shade val="15000"/>
-            </a:schemeClr>
-          </a:lnRef>
-          <a:fillRef idx="1">
-            <a:schemeClr val="accent1"/>
-          </a:fillRef>
-          <a:effectRef idx="0">
-            <a:schemeClr val="accent1"/>
-          </a:effectRef>
-          <a:fontRef idx="minor">
-            <a:schemeClr val="lt1"/>
-          </a:fontRef>
-        </p:style>
-        <p:txBody>
-          <a:bodyPr rtlCol="0" anchor="ctr"/>
-          <a:lstStyle/>
-          <a:p>
-            <a:pPr algn="ctr"/>
-            <a:endParaRPr lang="en-SE" sz="6859"/>
-          </a:p>
-        </p:txBody>
-      </p:sp>
-      <p:sp>
-        <p:nvSpPr>
-          <p:cNvPr id="15" name="Rectangle 22">
-            <a:extLst>
-              <a:ext uri="{FF2B5EF4-FFF2-40B4-BE49-F238E27FC236}">
-                <a16:creationId xmlns:a16="http://schemas.microsoft.com/office/drawing/2014/main" id="{D4AE11F8-F734-792F-1123-ED568F3712FF}"/>
-              </a:ext>
-            </a:extLst>
-          </p:cNvPr>
-          <p:cNvSpPr/>
-          <p:nvPr/>
-        </p:nvSpPr>
-        <p:spPr>
-          <a:xfrm>
-            <a:off x="6192781" y="4775603"/>
-            <a:ext cx="2870219" cy="507967"/>
-          </a:xfrm>
-          <a:prstGeom prst="rect">
-            <a:avLst/>
-          </a:prstGeom>
-          <a:noFill/>
-          <a:ln w="28575">
-            <a:solidFill>
-              <a:srgbClr val="F79647"/>
-            </a:solidFill>
-            <a:prstDash val="sysDot"/>
-          </a:ln>
-        </p:spPr>
-        <p:style>
-          <a:lnRef idx="2">
-            <a:schemeClr val="accent1">
-              <a:shade val="15000"/>
-            </a:schemeClr>
-          </a:lnRef>
-          <a:fillRef idx="1">
-            <a:schemeClr val="accent1"/>
-          </a:fillRef>
-          <a:effectRef idx="0">
-            <a:schemeClr val="accent1"/>
-          </a:effectRef>
-          <a:fontRef idx="minor">
-            <a:schemeClr val="lt1"/>
-          </a:fontRef>
-        </p:style>
-        <p:txBody>
-          <a:bodyPr rtlCol="0" anchor="ctr"/>
-          <a:lstStyle/>
-          <a:p>
-            <a:pPr algn="ctr"/>
-            <a:endParaRPr lang="en-SE" sz="6859"/>
-          </a:p>
-        </p:txBody>
-      </p:sp>
     </p:spTree>
     <p:extLst>
       <p:ext uri="{BB962C8B-B14F-4D97-AF65-F5344CB8AC3E}">
@@ -4043,299 +3273,4 @@
     </a:ext>
   </a:extLst>
 </a:theme>
-</file>
-
-<file path=ppt/theme/theme2.xml><?xml version="1.0" encoding="utf-8"?>
-<a:theme xmlns:a="http://schemas.openxmlformats.org/drawingml/2006/main" name="Office 主题​​">
-  <a:themeElements>
-    <a:clrScheme name="Office">
-      <a:dk1>
-        <a:sysClr val="windowText" lastClr="000000"/>
-      </a:dk1>
-      <a:lt1>
-        <a:sysClr val="window" lastClr="FFFFFF"/>
-      </a:lt1>
-      <a:dk2>
-        <a:srgbClr val="44546A"/>
-      </a:dk2>
-      <a:lt2>
-        <a:srgbClr val="E7E6E6"/>
-      </a:lt2>
-      <a:accent1>
-        <a:srgbClr val="4472C4"/>
-      </a:accent1>
-      <a:accent2>
-        <a:srgbClr val="ED7D31"/>
-      </a:accent2>
-      <a:accent3>
-        <a:srgbClr val="A5A5A5"/>
-      </a:accent3>
-      <a:accent4>
-        <a:srgbClr val="FFC000"/>
-      </a:accent4>
-      <a:accent5>
-        <a:srgbClr val="5B9BD5"/>
-      </a:accent5>
-      <a:accent6>
-        <a:srgbClr val="70AD47"/>
-      </a:accent6>
-      <a:hlink>
-        <a:srgbClr val="0563C1"/>
-      </a:hlink>
-      <a:folHlink>
-        <a:srgbClr val="954F72"/>
-      </a:folHlink>
-    </a:clrScheme>
-    <a:fontScheme name="Office">
-      <a:majorFont>
-        <a:latin typeface="等线 Light" panose="020F0302020204030204"/>
-        <a:ea typeface=""/>
-        <a:cs typeface=""/>
-        <a:font script="Jpan" typeface="游ゴシック Light"/>
-        <a:font script="Hang" typeface="맑은 고딕"/>
-        <a:font script="Hans" typeface="等线 Light"/>
-        <a:font script="Hant" typeface="新細明體"/>
-        <a:font script="Arab" typeface="Times New Roman"/>
-        <a:font script="Hebr" typeface="Times New Roman"/>
-        <a:font script="Thai" typeface="Angsana New"/>
-        <a:font script="Ethi" typeface="Nyala"/>
-        <a:font script="Beng" typeface="Vrinda"/>
-        <a:font script="Gujr" typeface="Shruti"/>
-        <a:font script="Khmr" typeface="MoolBoran"/>
-        <a:font script="Knda" typeface="Tunga"/>
-        <a:font script="Guru" typeface="Raavi"/>
-        <a:font script="Cans" typeface="Euphemia"/>
-        <a:font script="Cher" typeface="Plantagenet Cherokee"/>
-        <a:font script="Yiii" typeface="Microsoft Yi Baiti"/>
-        <a:font script="Tibt" typeface="Microsoft Himalaya"/>
-        <a:font script="Thaa" typeface="MV Boli"/>
-        <a:font script="Deva" typeface="Mangal"/>
-        <a:font script="Telu" typeface="Gautami"/>
-        <a:font script="Taml" typeface="Latha"/>
-        <a:font script="Syrc" typeface="Estrangelo Edessa"/>
-        <a:font script="Orya" typeface="Kalinga"/>
-        <a:font script="Mlym" typeface="Kartika"/>
-        <a:font script="Laoo" typeface="DokChampa"/>
-        <a:font script="Sinh" typeface="Iskoola Pota"/>
-        <a:font script="Mong" typeface="Mongolian Baiti"/>
-        <a:font script="Viet" typeface="Times New Roman"/>
-        <a:font script="Uigh" typeface="Microsoft Uighur"/>
-        <a:font script="Geor" typeface="Sylfaen"/>
-        <a:font script="Armn" typeface="Arial"/>
-        <a:font script="Bugi" typeface="Leelawadee UI"/>
-        <a:font script="Bopo" typeface="Microsoft JhengHei"/>
-        <a:font script="Java" typeface="Javanese Text"/>
-        <a:font script="Lisu" typeface="Segoe UI"/>
-        <a:font script="Mymr" typeface="Myanmar Text"/>
-        <a:font script="Nkoo" typeface="Ebrima"/>
-        <a:font script="Olck" typeface="Nirmala UI"/>
-        <a:font script="Osma" typeface="Ebrima"/>
-        <a:font script="Phag" typeface="Phagspa"/>
-        <a:font script="Syrn" typeface="Estrangelo Edessa"/>
-        <a:font script="Syrj" typeface="Estrangelo Edessa"/>
-        <a:font script="Syre" typeface="Estrangelo Edessa"/>
-        <a:font script="Sora" typeface="Nirmala UI"/>
-        <a:font script="Tale" typeface="Microsoft Tai Le"/>
-        <a:font script="Talu" typeface="Microsoft New Tai Lue"/>
-        <a:font script="Tfng" typeface="Ebrima"/>
-      </a:majorFont>
-      <a:minorFont>
-        <a:latin typeface="等线" panose="020F0502020204030204"/>
-        <a:ea typeface=""/>
-        <a:cs typeface=""/>
-        <a:font script="Jpan" typeface="游ゴシック"/>
-        <a:font script="Hang" typeface="맑은 고딕"/>
-        <a:font script="Hans" typeface="等线"/>
-        <a:font script="Hant" typeface="新細明體"/>
-        <a:font script="Arab" typeface="Arial"/>
-        <a:font script="Hebr" typeface="Arial"/>
-        <a:font script="Thai" typeface="Cordia New"/>
-        <a:font script="Ethi" typeface="Nyala"/>
-        <a:font script="Beng" typeface="Vrinda"/>
-        <a:font script="Gujr" typeface="Shruti"/>
-        <a:font script="Khmr" typeface="DaunPenh"/>
-        <a:font script="Knda" typeface="Tunga"/>
-        <a:font script="Guru" typeface="Raavi"/>
-        <a:font script="Cans" typeface="Euphemia"/>
-        <a:font script="Cher" typeface="Plantagenet Cherokee"/>
-        <a:font script="Yiii" typeface="Microsoft Yi Baiti"/>
-        <a:font script="Tibt" typeface="Microsoft Himalaya"/>
-        <a:font script="Thaa" typeface="MV Boli"/>
-        <a:font script="Deva" typeface="Mangal"/>
-        <a:font script="Telu" typeface="Gautami"/>
-        <a:font script="Taml" typeface="Latha"/>
-        <a:font script="Syrc" typeface="Estrangelo Edessa"/>
-        <a:font script="Orya" typeface="Kalinga"/>
-        <a:font script="Mlym" typeface="Kartika"/>
-        <a:font script="Laoo" typeface="DokChampa"/>
-        <a:font script="Sinh" typeface="Iskoola Pota"/>
-        <a:font script="Mong" typeface="Mongolian Baiti"/>
-        <a:font script="Viet" typeface="Arial"/>
-        <a:font script="Uigh" typeface="Microsoft Uighur"/>
-        <a:font script="Geor" typeface="Sylfaen"/>
-        <a:font script="Armn" typeface="Arial"/>
-        <a:font script="Bugi" typeface="Leelawadee UI"/>
-        <a:font script="Bopo" typeface="Microsoft JhengHei"/>
-        <a:font script="Java" typeface="Javanese Text"/>
-        <a:font script="Lisu" typeface="Segoe UI"/>
-        <a:font script="Mymr" typeface="Myanmar Text"/>
-        <a:font script="Nkoo" typeface="Ebrima"/>
-        <a:font script="Olck" typeface="Nirmala UI"/>
-        <a:font script="Osma" typeface="Ebrima"/>
-        <a:font script="Phag" typeface="Phagspa"/>
-        <a:font script="Syrn" typeface="Estrangelo Edessa"/>
-        <a:font script="Syrj" typeface="Estrangelo Edessa"/>
-        <a:font script="Syre" typeface="Estrangelo Edessa"/>
-        <a:font script="Sora" typeface="Nirmala UI"/>
-        <a:font script="Tale" typeface="Microsoft Tai Le"/>
-        <a:font script="Talu" typeface="Microsoft New Tai Lue"/>
-        <a:font script="Tfng" typeface="Ebrima"/>
-      </a:minorFont>
-    </a:fontScheme>
-    <a:fmtScheme name="Office">
-      <a:fillStyleLst>
-        <a:solidFill>
-          <a:schemeClr val="phClr"/>
-        </a:solidFill>
-        <a:gradFill rotWithShape="1">
-          <a:gsLst>
-            <a:gs pos="0">
-              <a:schemeClr val="phClr">
-                <a:lumMod val="110000"/>
-                <a:satMod val="105000"/>
-                <a:tint val="67000"/>
-              </a:schemeClr>
-            </a:gs>
-            <a:gs pos="50000">
-              <a:schemeClr val="phClr">
-                <a:lumMod val="105000"/>
-                <a:satMod val="103000"/>
-                <a:tint val="73000"/>
-              </a:schemeClr>
-            </a:gs>
-            <a:gs pos="100000">
-              <a:schemeClr val="phClr">
-                <a:lumMod val="105000"/>
-                <a:satMod val="109000"/>
-                <a:tint val="81000"/>
-              </a:schemeClr>
-            </a:gs>
-          </a:gsLst>
-          <a:lin ang="5400000" scaled="0"/>
-        </a:gradFill>
-        <a:gradFill rotWithShape="1">
-          <a:gsLst>
-            <a:gs pos="0">
-              <a:schemeClr val="phClr">
-                <a:satMod val="103000"/>
-                <a:lumMod val="102000"/>
-                <a:tint val="94000"/>
-              </a:schemeClr>
-            </a:gs>
-            <a:gs pos="50000">
-              <a:schemeClr val="phClr">
-                <a:satMod val="110000"/>
-                <a:lumMod val="100000"/>
-                <a:shade val="100000"/>
-              </a:schemeClr>
-            </a:gs>
-            <a:gs pos="100000">
-              <a:schemeClr val="phClr">
-                <a:lumMod val="99000"/>
-                <a:satMod val="120000"/>
-                <a:shade val="78000"/>
-              </a:schemeClr>
-            </a:gs>
-          </a:gsLst>
-          <a:lin ang="5400000" scaled="0"/>
-        </a:gradFill>
-      </a:fillStyleLst>
-      <a:lnStyleLst>
-        <a:ln w="6350" cap="flat" cmpd="sng" algn="ctr">
-          <a:solidFill>
-            <a:schemeClr val="phClr"/>
-          </a:solidFill>
-          <a:prstDash val="solid"/>
-          <a:miter lim="800000"/>
-        </a:ln>
-        <a:ln w="12700" cap="flat" cmpd="sng" algn="ctr">
-          <a:solidFill>
-            <a:schemeClr val="phClr"/>
-          </a:solidFill>
-          <a:prstDash val="solid"/>
-          <a:miter lim="800000"/>
-        </a:ln>
-        <a:ln w="19050" cap="flat" cmpd="sng" algn="ctr">
-          <a:solidFill>
-            <a:schemeClr val="phClr"/>
-          </a:solidFill>
-          <a:prstDash val="solid"/>
-          <a:miter lim="800000"/>
-        </a:ln>
-      </a:lnStyleLst>
-      <a:effectStyleLst>
-        <a:effectStyle>
-          <a:effectLst/>
-        </a:effectStyle>
-        <a:effectStyle>
-          <a:effectLst/>
-        </a:effectStyle>
-        <a:effectStyle>
-          <a:effectLst>
-            <a:outerShdw blurRad="57150" dist="19050" dir="5400000" algn="ctr" rotWithShape="0">
-              <a:srgbClr val="000000">
-                <a:alpha val="63000"/>
-              </a:srgbClr>
-            </a:outerShdw>
-          </a:effectLst>
-        </a:effectStyle>
-      </a:effectStyleLst>
-      <a:bgFillStyleLst>
-        <a:solidFill>
-          <a:schemeClr val="phClr"/>
-        </a:solidFill>
-        <a:solidFill>
-          <a:schemeClr val="phClr">
-            <a:tint val="95000"/>
-            <a:satMod val="170000"/>
-          </a:schemeClr>
-        </a:solidFill>
-        <a:gradFill rotWithShape="1">
-          <a:gsLst>
-            <a:gs pos="0">
-              <a:schemeClr val="phClr">
-                <a:tint val="93000"/>
-                <a:satMod val="150000"/>
-                <a:shade val="98000"/>
-                <a:lumMod val="102000"/>
-              </a:schemeClr>
-            </a:gs>
-            <a:gs pos="50000">
-              <a:schemeClr val="phClr">
-                <a:tint val="98000"/>
-                <a:satMod val="130000"/>
-                <a:shade val="90000"/>
-                <a:lumMod val="103000"/>
-              </a:schemeClr>
-            </a:gs>
-            <a:gs pos="100000">
-              <a:schemeClr val="phClr">
-                <a:shade val="63000"/>
-                <a:satMod val="120000"/>
-              </a:schemeClr>
-            </a:gs>
-          </a:gsLst>
-          <a:lin ang="5400000" scaled="0"/>
-        </a:gradFill>
-      </a:bgFillStyleLst>
-    </a:fmtScheme>
-  </a:themeElements>
-  <a:objectDefaults/>
-  <a:extraClrSchemeLst/>
-  <a:extLst>
-    <a:ext uri="{05A4C25C-085E-4340-85A3-A5531E510DB2}">
-      <thm15:themeFamily xmlns:thm15="http://schemas.microsoft.com/office/thememl/2012/main" name="Office Theme" id="{62F939B6-93AF-4DB8-9C6B-D6C7DFDC589F}" vid="{4A3C46E8-61CC-4603-A589-7422A47A8E4A}"/>
-    </a:ext>
-  </a:extLst>
-</a:theme>
 </file>
</xml_diff>